<commit_message>
Orain bai, amaituta (espero dugu)
</commit_message>
<xml_diff>
--- a/dokumentazioa/Proiektuaren aurkezpena.pptx
+++ b/dokumentazioa/Proiektuaren aurkezpena.pptx
@@ -5,30 +5,29 @@
     <p:sldMasterId id="2147483648" r:id="rId1"/>
   </p:sldMasterIdLst>
   <p:notesMasterIdLst>
-    <p:notesMasterId r:id="rId23"/>
+    <p:notesMasterId r:id="rId22"/>
   </p:notesMasterIdLst>
   <p:sldIdLst>
     <p:sldId id="302" r:id="rId2"/>
     <p:sldId id="303" r:id="rId3"/>
     <p:sldId id="304" r:id="rId4"/>
     <p:sldId id="305" r:id="rId5"/>
-    <p:sldId id="306" r:id="rId6"/>
-    <p:sldId id="307" r:id="rId7"/>
-    <p:sldId id="308" r:id="rId8"/>
-    <p:sldId id="309" r:id="rId9"/>
-    <p:sldId id="310" r:id="rId10"/>
-    <p:sldId id="311" r:id="rId11"/>
-    <p:sldId id="312" r:id="rId12"/>
-    <p:sldId id="313" r:id="rId13"/>
-    <p:sldId id="314" r:id="rId14"/>
-    <p:sldId id="315" r:id="rId15"/>
-    <p:sldId id="316" r:id="rId16"/>
-    <p:sldId id="317" r:id="rId17"/>
-    <p:sldId id="318" r:id="rId18"/>
-    <p:sldId id="323" r:id="rId19"/>
-    <p:sldId id="319" r:id="rId20"/>
-    <p:sldId id="320" r:id="rId21"/>
-    <p:sldId id="322" r:id="rId22"/>
+    <p:sldId id="307" r:id="rId6"/>
+    <p:sldId id="308" r:id="rId7"/>
+    <p:sldId id="309" r:id="rId8"/>
+    <p:sldId id="310" r:id="rId9"/>
+    <p:sldId id="311" r:id="rId10"/>
+    <p:sldId id="312" r:id="rId11"/>
+    <p:sldId id="313" r:id="rId12"/>
+    <p:sldId id="314" r:id="rId13"/>
+    <p:sldId id="315" r:id="rId14"/>
+    <p:sldId id="316" r:id="rId15"/>
+    <p:sldId id="317" r:id="rId16"/>
+    <p:sldId id="318" r:id="rId17"/>
+    <p:sldId id="323" r:id="rId18"/>
+    <p:sldId id="319" r:id="rId19"/>
+    <p:sldId id="320" r:id="rId20"/>
+    <p:sldId id="322" r:id="rId21"/>
   </p:sldIdLst>
   <p:sldSz cx="9144000" cy="6858000" type="screen4x3"/>
   <p:notesSz cx="7099300" cy="10234613"/>
@@ -1001,7 +1000,7 @@
         <p:nvSpPr>
           <p:cNvPr id="25607" name="Rectangle 6"/>
           <p:cNvSpPr>
-            <a:spLocks noGrp="1" noChangeArrowheads="1"/>
+            <a:spLocks noGrp="1" noRot="1" noChangeAspect="1" noChangeArrowheads="1"/>
           </p:cNvSpPr>
           <p:nvPr>
             <p:ph type="sldImg"/>
@@ -1472,7 +1471,7 @@
         <p:nvSpPr>
           <p:cNvPr id="16385" name="Rectangle 1"/>
           <p:cNvSpPr txBox="1">
-            <a:spLocks noChangeArrowheads="1"/>
+            <a:spLocks noGrp="1" noRot="1" noChangeAspect="1" noChangeArrowheads="1"/>
           </p:cNvSpPr>
           <p:nvPr>
             <p:ph type="sldImg"/>
@@ -1514,7 +1513,7 @@
         <p:nvSpPr>
           <p:cNvPr id="16386" name="Rectangle 2"/>
           <p:cNvSpPr txBox="1">
-            <a:spLocks noChangeArrowheads="1"/>
+            <a:spLocks noGrp="1" noChangeArrowheads="1"/>
           </p:cNvSpPr>
           <p:nvPr>
             <p:ph type="body" idx="1"/>
@@ -1607,146 +1606,9 @@
       </p:grpSpPr>
       <p:sp>
         <p:nvSpPr>
-          <p:cNvPr id="25601" name="Rectangle 1"/>
-          <p:cNvSpPr txBox="1">
-            <a:spLocks noChangeArrowheads="1"/>
-          </p:cNvSpPr>
-          <p:nvPr>
-            <p:ph type="sldImg"/>
-          </p:nvPr>
-        </p:nvSpPr>
-        <p:spPr bwMode="auto">
-          <a:xfrm>
-            <a:off x="1312863" y="1027113"/>
-            <a:ext cx="4933950" cy="3700462"/>
-          </a:xfrm>
-          <a:prstGeom prst="rect">
-            <a:avLst/>
-          </a:prstGeom>
-          <a:solidFill>
-            <a:srgbClr val="FFFFFF"/>
-          </a:solidFill>
-          <a:ln>
-            <a:solidFill>
-              <a:srgbClr val="000000"/>
-            </a:solidFill>
-            <a:miter lim="800000"/>
-            <a:headEnd/>
-            <a:tailEnd/>
-          </a:ln>
-          <a:extLst>
-            <a:ext uri="{AF507438-7753-43E0-B8FC-AC1667EBCBE1}">
-              <a14:hiddenEffects xmlns:a14="http://schemas.microsoft.com/office/drawing/2010/main">
-                <a:effectLst>
-                  <a:outerShdw dist="35921" dir="2700000" algn="ctr" rotWithShape="0">
-                    <a:srgbClr val="808080"/>
-                  </a:outerShdw>
-                </a:effectLst>
-              </a14:hiddenEffects>
-            </a:ext>
-          </a:extLst>
-        </p:spPr>
-      </p:sp>
-      <p:sp>
-        <p:nvSpPr>
-          <p:cNvPr id="25602" name="Rectangle 2"/>
-          <p:cNvSpPr txBox="1">
-            <a:spLocks noChangeArrowheads="1"/>
-          </p:cNvSpPr>
-          <p:nvPr>
-            <p:ph type="body" idx="1"/>
-          </p:nvPr>
-        </p:nvSpPr>
-        <p:spPr bwMode="auto">
-          <a:xfrm>
-            <a:off x="1169988" y="5086350"/>
-            <a:ext cx="5226050" cy="4106863"/>
-          </a:xfrm>
-          <a:prstGeom prst="rect">
-            <a:avLst/>
-          </a:prstGeom>
-          <a:noFill/>
-          <a:ln/>
-          <a:extLst>
-            <a:ext uri="{909E8E84-426E-40DD-AFC4-6F175D3DCCD1}">
-              <a14:hiddenFill xmlns:a14="http://schemas.microsoft.com/office/drawing/2010/main">
-                <a:solidFill>
-                  <a:srgbClr val="FFFFFF"/>
-                </a:solidFill>
-              </a14:hiddenFill>
-            </a:ext>
-            <a:ext uri="{91240B29-F687-4F45-9708-019B960494DF}">
-              <a14:hiddenLine xmlns:a14="http://schemas.microsoft.com/office/drawing/2010/main" w="9525" cap="flat">
-                <a:solidFill>
-                  <a:srgbClr val="808080"/>
-                </a:solidFill>
-                <a:round/>
-                <a:headEnd/>
-                <a:tailEnd/>
-              </a14:hiddenLine>
-            </a:ext>
-            <a:ext uri="{AF507438-7753-43E0-B8FC-AC1667EBCBE1}">
-              <a14:hiddenEffects xmlns:a14="http://schemas.microsoft.com/office/drawing/2010/main">
-                <a:effectLst>
-                  <a:outerShdw dist="35921" dir="2700000" algn="ctr" rotWithShape="0">
-                    <a:srgbClr val="808080"/>
-                  </a:outerShdw>
-                </a:effectLst>
-              </a14:hiddenEffects>
-            </a:ext>
-          </a:extLst>
-        </p:spPr>
-        <p:txBody>
-          <a:bodyPr wrap="none" anchor="ctr"/>
-          <a:lstStyle/>
-          <a:p>
-            <a:endParaRPr lang="es-ES" altLang="es-ES"/>
-          </a:p>
-        </p:txBody>
-      </p:sp>
-    </p:spTree>
-    <p:extLst>
-      <p:ext uri="{BB962C8B-B14F-4D97-AF65-F5344CB8AC3E}">
-        <p14:creationId xmlns:p14="http://schemas.microsoft.com/office/powerpoint/2010/main" val="2025402897"/>
-      </p:ext>
-    </p:extLst>
-  </p:cSld>
-  <p:clrMapOvr>
-    <a:masterClrMapping/>
-  </p:clrMapOvr>
-</p:notes>
-</file>
-
-<file path=ppt/notesSlides/notesSlide11.xml><?xml version="1.0" encoding="utf-8"?>
-<p:notes xmlns:a="http://schemas.openxmlformats.org/drawingml/2006/main" xmlns:r="http://schemas.openxmlformats.org/officeDocument/2006/relationships" xmlns:p="http://schemas.openxmlformats.org/presentationml/2006/main">
-  <p:cSld>
-    <p:bg>
-      <p:bgPr>
-        <a:solidFill>
-          <a:srgbClr val="FFFFFF"/>
-        </a:solidFill>
-        <a:effectLst/>
-      </p:bgPr>
-    </p:bg>
-    <p:spTree>
-      <p:nvGrpSpPr>
-        <p:cNvPr id="1" name=""/>
-        <p:cNvGrpSpPr/>
-        <p:nvPr/>
-      </p:nvGrpSpPr>
-      <p:grpSpPr>
-        <a:xfrm>
-          <a:off x="0" y="0"/>
-          <a:ext cx="0" cy="0"/>
-          <a:chOff x="0" y="0"/>
-          <a:chExt cx="0" cy="0"/>
-        </a:xfrm>
-      </p:grpSpPr>
-      <p:sp>
-        <p:nvSpPr>
           <p:cNvPr id="26625" name="Rectangle 1"/>
           <p:cNvSpPr txBox="1">
-            <a:spLocks noChangeArrowheads="1"/>
+            <a:spLocks noGrp="1" noRot="1" noChangeAspect="1" noChangeArrowheads="1"/>
           </p:cNvSpPr>
           <p:nvPr>
             <p:ph type="sldImg"/>
@@ -1788,7 +1650,7 @@
         <p:nvSpPr>
           <p:cNvPr id="26626" name="Rectangle 2"/>
           <p:cNvSpPr txBox="1">
-            <a:spLocks noChangeArrowheads="1"/>
+            <a:spLocks noGrp="1" noChangeArrowheads="1"/>
           </p:cNvSpPr>
           <p:nvPr>
             <p:ph type="body" idx="1"/>
@@ -1854,7 +1716,7 @@
 </p:notes>
 </file>
 
-<file path=ppt/notesSlides/notesSlide12.xml><?xml version="1.0" encoding="utf-8"?>
+<file path=ppt/notesSlides/notesSlide11.xml><?xml version="1.0" encoding="utf-8"?>
 <p:notes xmlns:a="http://schemas.openxmlformats.org/drawingml/2006/main" xmlns:r="http://schemas.openxmlformats.org/officeDocument/2006/relationships" xmlns:p="http://schemas.openxmlformats.org/presentationml/2006/main">
   <p:cSld>
     <p:bg>
@@ -1883,7 +1745,7 @@
         <p:nvSpPr>
           <p:cNvPr id="27649" name="Rectangle 1"/>
           <p:cNvSpPr txBox="1">
-            <a:spLocks noChangeArrowheads="1"/>
+            <a:spLocks noGrp="1" noRot="1" noChangeAspect="1" noChangeArrowheads="1"/>
           </p:cNvSpPr>
           <p:nvPr>
             <p:ph type="sldImg"/>
@@ -1925,7 +1787,7 @@
         <p:nvSpPr>
           <p:cNvPr id="27650" name="Rectangle 2"/>
           <p:cNvSpPr txBox="1">
-            <a:spLocks noChangeArrowheads="1"/>
+            <a:spLocks noGrp="1" noChangeArrowheads="1"/>
           </p:cNvSpPr>
           <p:nvPr>
             <p:ph type="body" idx="1"/>
@@ -1991,7 +1853,7 @@
 </p:notes>
 </file>
 
-<file path=ppt/notesSlides/notesSlide13.xml><?xml version="1.0" encoding="utf-8"?>
+<file path=ppt/notesSlides/notesSlide12.xml><?xml version="1.0" encoding="utf-8"?>
 <p:notes xmlns:a="http://schemas.openxmlformats.org/drawingml/2006/main" xmlns:r="http://schemas.openxmlformats.org/officeDocument/2006/relationships" xmlns:p="http://schemas.openxmlformats.org/presentationml/2006/main">
   <p:cSld>
     <p:bg>
@@ -2020,7 +1882,7 @@
         <p:nvSpPr>
           <p:cNvPr id="26625" name="Rectangle 1"/>
           <p:cNvSpPr txBox="1">
-            <a:spLocks noChangeArrowheads="1"/>
+            <a:spLocks noGrp="1" noRot="1" noChangeAspect="1" noChangeArrowheads="1"/>
           </p:cNvSpPr>
           <p:nvPr>
             <p:ph type="sldImg"/>
@@ -2062,7 +1924,7 @@
         <p:nvSpPr>
           <p:cNvPr id="26626" name="Rectangle 2"/>
           <p:cNvSpPr txBox="1">
-            <a:spLocks noChangeArrowheads="1"/>
+            <a:spLocks noGrp="1" noChangeArrowheads="1"/>
           </p:cNvSpPr>
           <p:nvPr>
             <p:ph type="body" idx="1"/>
@@ -2128,7 +1990,7 @@
 </p:notes>
 </file>
 
-<file path=ppt/notesSlides/notesSlide14.xml><?xml version="1.0" encoding="utf-8"?>
+<file path=ppt/notesSlides/notesSlide13.xml><?xml version="1.0" encoding="utf-8"?>
 <p:notes xmlns:a="http://schemas.openxmlformats.org/drawingml/2006/main" xmlns:r="http://schemas.openxmlformats.org/officeDocument/2006/relationships" xmlns:p="http://schemas.openxmlformats.org/presentationml/2006/main">
   <p:cSld>
     <p:bg>
@@ -2157,7 +2019,7 @@
         <p:nvSpPr>
           <p:cNvPr id="26625" name="Rectangle 1"/>
           <p:cNvSpPr txBox="1">
-            <a:spLocks noChangeArrowheads="1"/>
+            <a:spLocks noGrp="1" noRot="1" noChangeAspect="1" noChangeArrowheads="1"/>
           </p:cNvSpPr>
           <p:nvPr>
             <p:ph type="sldImg"/>
@@ -2199,7 +2061,7 @@
         <p:nvSpPr>
           <p:cNvPr id="26626" name="Rectangle 2"/>
           <p:cNvSpPr txBox="1">
-            <a:spLocks noChangeArrowheads="1"/>
+            <a:spLocks noGrp="1" noChangeArrowheads="1"/>
           </p:cNvSpPr>
           <p:nvPr>
             <p:ph type="body" idx="1"/>
@@ -2265,7 +2127,7 @@
 </p:notes>
 </file>
 
-<file path=ppt/notesSlides/notesSlide15.xml><?xml version="1.0" encoding="utf-8"?>
+<file path=ppt/notesSlides/notesSlide14.xml><?xml version="1.0" encoding="utf-8"?>
 <p:notes xmlns:a="http://schemas.openxmlformats.org/drawingml/2006/main" xmlns:r="http://schemas.openxmlformats.org/officeDocument/2006/relationships" xmlns:p="http://schemas.openxmlformats.org/presentationml/2006/main">
   <p:cSld>
     <p:bg>
@@ -2294,7 +2156,7 @@
         <p:nvSpPr>
           <p:cNvPr id="26625" name="Rectangle 1"/>
           <p:cNvSpPr txBox="1">
-            <a:spLocks noChangeArrowheads="1"/>
+            <a:spLocks noGrp="1" noRot="1" noChangeAspect="1" noChangeArrowheads="1"/>
           </p:cNvSpPr>
           <p:nvPr>
             <p:ph type="sldImg"/>
@@ -2336,7 +2198,7 @@
         <p:nvSpPr>
           <p:cNvPr id="26626" name="Rectangle 2"/>
           <p:cNvSpPr txBox="1">
-            <a:spLocks noChangeArrowheads="1"/>
+            <a:spLocks noGrp="1" noChangeArrowheads="1"/>
           </p:cNvSpPr>
           <p:nvPr>
             <p:ph type="body" idx="1"/>
@@ -2402,7 +2264,7 @@
 </p:notes>
 </file>
 
-<file path=ppt/notesSlides/notesSlide16.xml><?xml version="1.0" encoding="utf-8"?>
+<file path=ppt/notesSlides/notesSlide15.xml><?xml version="1.0" encoding="utf-8"?>
 <p:notes xmlns:a="http://schemas.openxmlformats.org/drawingml/2006/main" xmlns:r="http://schemas.openxmlformats.org/officeDocument/2006/relationships" xmlns:p="http://schemas.openxmlformats.org/presentationml/2006/main">
   <p:cSld>
     <p:bg>
@@ -2431,7 +2293,7 @@
         <p:nvSpPr>
           <p:cNvPr id="26625" name="Rectangle 1"/>
           <p:cNvSpPr txBox="1">
-            <a:spLocks noChangeArrowheads="1"/>
+            <a:spLocks noGrp="1" noRot="1" noChangeAspect="1" noChangeArrowheads="1"/>
           </p:cNvSpPr>
           <p:nvPr>
             <p:ph type="sldImg"/>
@@ -2473,7 +2335,7 @@
         <p:nvSpPr>
           <p:cNvPr id="26626" name="Rectangle 2"/>
           <p:cNvSpPr txBox="1">
-            <a:spLocks noChangeArrowheads="1"/>
+            <a:spLocks noGrp="1" noChangeArrowheads="1"/>
           </p:cNvSpPr>
           <p:nvPr>
             <p:ph type="body" idx="1"/>
@@ -2539,7 +2401,7 @@
 </p:notes>
 </file>
 
-<file path=ppt/notesSlides/notesSlide17.xml><?xml version="1.0" encoding="utf-8"?>
+<file path=ppt/notesSlides/notesSlide16.xml><?xml version="1.0" encoding="utf-8"?>
 <p:notes xmlns:a="http://schemas.openxmlformats.org/drawingml/2006/main" xmlns:r="http://schemas.openxmlformats.org/officeDocument/2006/relationships" xmlns:p="http://schemas.openxmlformats.org/presentationml/2006/main">
   <p:cSld>
     <p:bg>
@@ -2780,7 +2642,7 @@
                 <a:cs typeface="DejaVu Sans" pitchFamily="34" charset="0"/>
               </a:rPr>
               <a:pPr eaLnBrk="1" hangingPunct="1"/>
-              <a:t>18</a:t>
+              <a:t>17</a:t>
             </a:fld>
             <a:endParaRPr lang="en-GB" altLang="es-ES" sz="1300">
               <a:solidFill>
@@ -3175,7 +3037,7 @@
                 <a:buFontTx/>
                 <a:buNone/>
               </a:pPr>
-              <a:t>18</a:t>
+              <a:t>17</a:t>
             </a:fld>
             <a:endParaRPr lang="en-GB" altLang="es-ES" sz="1300">
               <a:solidFill>
@@ -3297,7 +3159,7 @@
 </p:notes>
 </file>
 
-<file path=ppt/notesSlides/notesSlide18.xml><?xml version="1.0" encoding="utf-8"?>
+<file path=ppt/notesSlides/notesSlide17.xml><?xml version="1.0" encoding="utf-8"?>
 <p:notes xmlns:a="http://schemas.openxmlformats.org/drawingml/2006/main" xmlns:r="http://schemas.openxmlformats.org/officeDocument/2006/relationships" xmlns:p="http://schemas.openxmlformats.org/presentationml/2006/main">
   <p:cSld>
     <p:spTree>
@@ -3529,7 +3391,7 @@
                 <a:cs typeface="DejaVu Sans" pitchFamily="34" charset="0"/>
               </a:rPr>
               <a:pPr eaLnBrk="1" hangingPunct="1"/>
-              <a:t>21</a:t>
+              <a:t>20</a:t>
             </a:fld>
             <a:endParaRPr lang="en-GB" altLang="es-ES" sz="1300">
               <a:solidFill>
@@ -3708,7 +3570,7 @@
                 </a:solidFill>
               </a:rPr>
               <a:pPr algn="r" eaLnBrk="1" hangingPunct="1"/>
-              <a:t>21</a:t>
+              <a:t>20</a:t>
             </a:fld>
             <a:endParaRPr lang="en-GB" altLang="es-ES" sz="1300">
               <a:solidFill>
@@ -3722,7 +3584,7 @@
         <p:nvSpPr>
           <p:cNvPr id="117764" name="Rectangle 2"/>
           <p:cNvSpPr>
-            <a:spLocks noChangeArrowheads="1" noTextEdit="1"/>
+            <a:spLocks noGrp="1" noRot="1" noChangeAspect="1" noChangeArrowheads="1" noTextEdit="1"/>
           </p:cNvSpPr>
           <p:nvPr>
             <p:ph type="sldImg"/>
@@ -3822,7 +3684,7 @@
         <p:nvSpPr>
           <p:cNvPr id="17409" name="Rectangle 1"/>
           <p:cNvSpPr txBox="1">
-            <a:spLocks noChangeArrowheads="1"/>
+            <a:spLocks noGrp="1" noRot="1" noChangeAspect="1" noChangeArrowheads="1"/>
           </p:cNvSpPr>
           <p:nvPr>
             <p:ph type="sldImg"/>
@@ -3864,7 +3726,7 @@
         <p:nvSpPr>
           <p:cNvPr id="17410" name="Rectangle 2"/>
           <p:cNvSpPr txBox="1">
-            <a:spLocks noChangeArrowheads="1"/>
+            <a:spLocks noGrp="1" noChangeArrowheads="1"/>
           </p:cNvSpPr>
           <p:nvPr>
             <p:ph type="body" idx="1"/>
@@ -3959,7 +3821,7 @@
         <p:nvSpPr>
           <p:cNvPr id="18433" name="Rectangle 1"/>
           <p:cNvSpPr txBox="1">
-            <a:spLocks noChangeArrowheads="1"/>
+            <a:spLocks noGrp="1" noRot="1" noChangeAspect="1" noChangeArrowheads="1"/>
           </p:cNvSpPr>
           <p:nvPr>
             <p:ph type="sldImg"/>
@@ -4001,7 +3863,7 @@
         <p:nvSpPr>
           <p:cNvPr id="18434" name="Rectangle 2"/>
           <p:cNvSpPr txBox="1">
-            <a:spLocks noChangeArrowheads="1"/>
+            <a:spLocks noGrp="1" noChangeArrowheads="1"/>
           </p:cNvSpPr>
           <p:nvPr>
             <p:ph type="body" idx="1"/>
@@ -4096,7 +3958,7 @@
         <p:nvSpPr>
           <p:cNvPr id="19457" name="Rectangle 1"/>
           <p:cNvSpPr txBox="1">
-            <a:spLocks noChangeArrowheads="1"/>
+            <a:spLocks noGrp="1" noRot="1" noChangeAspect="1" noChangeArrowheads="1"/>
           </p:cNvSpPr>
           <p:nvPr>
             <p:ph type="sldImg"/>
@@ -4138,7 +4000,7 @@
         <p:nvSpPr>
           <p:cNvPr id="19458" name="Rectangle 2"/>
           <p:cNvSpPr txBox="1">
-            <a:spLocks noChangeArrowheads="1"/>
+            <a:spLocks noGrp="1" noChangeArrowheads="1"/>
           </p:cNvSpPr>
           <p:nvPr>
             <p:ph type="body" idx="1"/>
@@ -4231,146 +4093,9 @@
       </p:grpSpPr>
       <p:sp>
         <p:nvSpPr>
-          <p:cNvPr id="20481" name="Rectangle 1"/>
-          <p:cNvSpPr txBox="1">
-            <a:spLocks noChangeArrowheads="1"/>
-          </p:cNvSpPr>
-          <p:nvPr>
-            <p:ph type="sldImg"/>
-          </p:nvPr>
-        </p:nvSpPr>
-        <p:spPr bwMode="auto">
-          <a:xfrm>
-            <a:off x="1312863" y="1027113"/>
-            <a:ext cx="4933950" cy="3700462"/>
-          </a:xfrm>
-          <a:prstGeom prst="rect">
-            <a:avLst/>
-          </a:prstGeom>
-          <a:solidFill>
-            <a:srgbClr val="FFFFFF"/>
-          </a:solidFill>
-          <a:ln>
-            <a:solidFill>
-              <a:srgbClr val="000000"/>
-            </a:solidFill>
-            <a:miter lim="800000"/>
-            <a:headEnd/>
-            <a:tailEnd/>
-          </a:ln>
-          <a:extLst>
-            <a:ext uri="{AF507438-7753-43E0-B8FC-AC1667EBCBE1}">
-              <a14:hiddenEffects xmlns:a14="http://schemas.microsoft.com/office/drawing/2010/main">
-                <a:effectLst>
-                  <a:outerShdw dist="35921" dir="2700000" algn="ctr" rotWithShape="0">
-                    <a:srgbClr val="808080"/>
-                  </a:outerShdw>
-                </a:effectLst>
-              </a14:hiddenEffects>
-            </a:ext>
-          </a:extLst>
-        </p:spPr>
-      </p:sp>
-      <p:sp>
-        <p:nvSpPr>
-          <p:cNvPr id="20482" name="Rectangle 2"/>
-          <p:cNvSpPr txBox="1">
-            <a:spLocks noChangeArrowheads="1"/>
-          </p:cNvSpPr>
-          <p:nvPr>
-            <p:ph type="body" idx="1"/>
-          </p:nvPr>
-        </p:nvSpPr>
-        <p:spPr bwMode="auto">
-          <a:xfrm>
-            <a:off x="1169988" y="5086350"/>
-            <a:ext cx="5226050" cy="4106863"/>
-          </a:xfrm>
-          <a:prstGeom prst="rect">
-            <a:avLst/>
-          </a:prstGeom>
-          <a:noFill/>
-          <a:ln/>
-          <a:extLst>
-            <a:ext uri="{909E8E84-426E-40DD-AFC4-6F175D3DCCD1}">
-              <a14:hiddenFill xmlns:a14="http://schemas.microsoft.com/office/drawing/2010/main">
-                <a:solidFill>
-                  <a:srgbClr val="FFFFFF"/>
-                </a:solidFill>
-              </a14:hiddenFill>
-            </a:ext>
-            <a:ext uri="{91240B29-F687-4F45-9708-019B960494DF}">
-              <a14:hiddenLine xmlns:a14="http://schemas.microsoft.com/office/drawing/2010/main" w="9525" cap="flat">
-                <a:solidFill>
-                  <a:srgbClr val="808080"/>
-                </a:solidFill>
-                <a:round/>
-                <a:headEnd/>
-                <a:tailEnd/>
-              </a14:hiddenLine>
-            </a:ext>
-            <a:ext uri="{AF507438-7753-43E0-B8FC-AC1667EBCBE1}">
-              <a14:hiddenEffects xmlns:a14="http://schemas.microsoft.com/office/drawing/2010/main">
-                <a:effectLst>
-                  <a:outerShdw dist="35921" dir="2700000" algn="ctr" rotWithShape="0">
-                    <a:srgbClr val="808080"/>
-                  </a:outerShdw>
-                </a:effectLst>
-              </a14:hiddenEffects>
-            </a:ext>
-          </a:extLst>
-        </p:spPr>
-        <p:txBody>
-          <a:bodyPr wrap="none" anchor="ctr"/>
-          <a:lstStyle/>
-          <a:p>
-            <a:endParaRPr lang="es-ES" altLang="es-ES"/>
-          </a:p>
-        </p:txBody>
-      </p:sp>
-    </p:spTree>
-    <p:extLst>
-      <p:ext uri="{BB962C8B-B14F-4D97-AF65-F5344CB8AC3E}">
-        <p14:creationId xmlns:p14="http://schemas.microsoft.com/office/powerpoint/2010/main" val="2203118508"/>
-      </p:ext>
-    </p:extLst>
-  </p:cSld>
-  <p:clrMapOvr>
-    <a:masterClrMapping/>
-  </p:clrMapOvr>
-</p:notes>
-</file>
-
-<file path=ppt/notesSlides/notesSlide6.xml><?xml version="1.0" encoding="utf-8"?>
-<p:notes xmlns:a="http://schemas.openxmlformats.org/drawingml/2006/main" xmlns:r="http://schemas.openxmlformats.org/officeDocument/2006/relationships" xmlns:p="http://schemas.openxmlformats.org/presentationml/2006/main">
-  <p:cSld>
-    <p:bg>
-      <p:bgPr>
-        <a:solidFill>
-          <a:srgbClr val="FFFFFF"/>
-        </a:solidFill>
-        <a:effectLst/>
-      </p:bgPr>
-    </p:bg>
-    <p:spTree>
-      <p:nvGrpSpPr>
-        <p:cNvPr id="1" name=""/>
-        <p:cNvGrpSpPr/>
-        <p:nvPr/>
-      </p:nvGrpSpPr>
-      <p:grpSpPr>
-        <a:xfrm>
-          <a:off x="0" y="0"/>
-          <a:ext cx="0" cy="0"/>
-          <a:chOff x="0" y="0"/>
-          <a:chExt cx="0" cy="0"/>
-        </a:xfrm>
-      </p:grpSpPr>
-      <p:sp>
-        <p:nvSpPr>
           <p:cNvPr id="21505" name="Rectangle 1"/>
           <p:cNvSpPr txBox="1">
-            <a:spLocks noChangeArrowheads="1"/>
+            <a:spLocks noGrp="1" noRot="1" noChangeAspect="1" noChangeArrowheads="1"/>
           </p:cNvSpPr>
           <p:nvPr>
             <p:ph type="sldImg"/>
@@ -4412,7 +4137,7 @@
         <p:nvSpPr>
           <p:cNvPr id="21506" name="Rectangle 2"/>
           <p:cNvSpPr txBox="1">
-            <a:spLocks noChangeArrowheads="1"/>
+            <a:spLocks noGrp="1" noChangeArrowheads="1"/>
           </p:cNvSpPr>
           <p:nvPr>
             <p:ph type="body" idx="1"/>
@@ -4478,7 +4203,7 @@
 </p:notes>
 </file>
 
-<file path=ppt/notesSlides/notesSlide7.xml><?xml version="1.0" encoding="utf-8"?>
+<file path=ppt/notesSlides/notesSlide6.xml><?xml version="1.0" encoding="utf-8"?>
 <p:notes xmlns:a="http://schemas.openxmlformats.org/drawingml/2006/main" xmlns:r="http://schemas.openxmlformats.org/officeDocument/2006/relationships" xmlns:p="http://schemas.openxmlformats.org/presentationml/2006/main">
   <p:cSld>
     <p:bg>
@@ -4507,7 +4232,7 @@
         <p:nvSpPr>
           <p:cNvPr id="22529" name="Rectangle 1"/>
           <p:cNvSpPr txBox="1">
-            <a:spLocks noChangeArrowheads="1"/>
+            <a:spLocks noGrp="1" noRot="1" noChangeAspect="1" noChangeArrowheads="1"/>
           </p:cNvSpPr>
           <p:nvPr>
             <p:ph type="sldImg"/>
@@ -4549,7 +4274,7 @@
         <p:nvSpPr>
           <p:cNvPr id="22530" name="Rectangle 2"/>
           <p:cNvSpPr txBox="1">
-            <a:spLocks noChangeArrowheads="1"/>
+            <a:spLocks noGrp="1" noChangeArrowheads="1"/>
           </p:cNvSpPr>
           <p:nvPr>
             <p:ph type="body" idx="1"/>
@@ -4615,7 +4340,7 @@
 </p:notes>
 </file>
 
-<file path=ppt/notesSlides/notesSlide8.xml><?xml version="1.0" encoding="utf-8"?>
+<file path=ppt/notesSlides/notesSlide7.xml><?xml version="1.0" encoding="utf-8"?>
 <p:notes xmlns:a="http://schemas.openxmlformats.org/drawingml/2006/main" xmlns:r="http://schemas.openxmlformats.org/officeDocument/2006/relationships" xmlns:p="http://schemas.openxmlformats.org/presentationml/2006/main">
   <p:cSld>
     <p:bg>
@@ -4644,7 +4369,7 @@
         <p:nvSpPr>
           <p:cNvPr id="23553" name="Rectangle 1"/>
           <p:cNvSpPr txBox="1">
-            <a:spLocks noChangeArrowheads="1"/>
+            <a:spLocks noGrp="1" noRot="1" noChangeAspect="1" noChangeArrowheads="1"/>
           </p:cNvSpPr>
           <p:nvPr>
             <p:ph type="sldImg"/>
@@ -4686,7 +4411,7 @@
         <p:nvSpPr>
           <p:cNvPr id="23554" name="Rectangle 2"/>
           <p:cNvSpPr txBox="1">
-            <a:spLocks noChangeArrowheads="1"/>
+            <a:spLocks noGrp="1" noChangeArrowheads="1"/>
           </p:cNvSpPr>
           <p:nvPr>
             <p:ph type="body" idx="1"/>
@@ -4752,7 +4477,7 @@
 </p:notes>
 </file>
 
-<file path=ppt/notesSlides/notesSlide9.xml><?xml version="1.0" encoding="utf-8"?>
+<file path=ppt/notesSlides/notesSlide8.xml><?xml version="1.0" encoding="utf-8"?>
 <p:notes xmlns:a="http://schemas.openxmlformats.org/drawingml/2006/main" xmlns:r="http://schemas.openxmlformats.org/officeDocument/2006/relationships" xmlns:p="http://schemas.openxmlformats.org/presentationml/2006/main">
   <p:cSld>
     <p:bg>
@@ -4781,7 +4506,7 @@
         <p:nvSpPr>
           <p:cNvPr id="24577" name="Rectangle 1"/>
           <p:cNvSpPr txBox="1">
-            <a:spLocks noChangeArrowheads="1"/>
+            <a:spLocks noGrp="1" noRot="1" noChangeAspect="1" noChangeArrowheads="1"/>
           </p:cNvSpPr>
           <p:nvPr>
             <p:ph type="sldImg"/>
@@ -4823,7 +4548,7 @@
         <p:nvSpPr>
           <p:cNvPr id="24578" name="Rectangle 2"/>
           <p:cNvSpPr txBox="1">
-            <a:spLocks noChangeArrowheads="1"/>
+            <a:spLocks noGrp="1" noChangeArrowheads="1"/>
           </p:cNvSpPr>
           <p:nvPr>
             <p:ph type="body" idx="1"/>
@@ -4880,6 +4605,143 @@
     <p:extLst>
       <p:ext uri="{BB962C8B-B14F-4D97-AF65-F5344CB8AC3E}">
         <p14:creationId xmlns:p14="http://schemas.microsoft.com/office/powerpoint/2010/main" val="2378528734"/>
+      </p:ext>
+    </p:extLst>
+  </p:cSld>
+  <p:clrMapOvr>
+    <a:masterClrMapping/>
+  </p:clrMapOvr>
+</p:notes>
+</file>
+
+<file path=ppt/notesSlides/notesSlide9.xml><?xml version="1.0" encoding="utf-8"?>
+<p:notes xmlns:a="http://schemas.openxmlformats.org/drawingml/2006/main" xmlns:r="http://schemas.openxmlformats.org/officeDocument/2006/relationships" xmlns:p="http://schemas.openxmlformats.org/presentationml/2006/main">
+  <p:cSld>
+    <p:bg>
+      <p:bgPr>
+        <a:solidFill>
+          <a:srgbClr val="FFFFFF"/>
+        </a:solidFill>
+        <a:effectLst/>
+      </p:bgPr>
+    </p:bg>
+    <p:spTree>
+      <p:nvGrpSpPr>
+        <p:cNvPr id="1" name=""/>
+        <p:cNvGrpSpPr/>
+        <p:nvPr/>
+      </p:nvGrpSpPr>
+      <p:grpSpPr>
+        <a:xfrm>
+          <a:off x="0" y="0"/>
+          <a:ext cx="0" cy="0"/>
+          <a:chOff x="0" y="0"/>
+          <a:chExt cx="0" cy="0"/>
+        </a:xfrm>
+      </p:grpSpPr>
+      <p:sp>
+        <p:nvSpPr>
+          <p:cNvPr id="25601" name="Rectangle 1"/>
+          <p:cNvSpPr txBox="1">
+            <a:spLocks noGrp="1" noRot="1" noChangeAspect="1" noChangeArrowheads="1"/>
+          </p:cNvSpPr>
+          <p:nvPr>
+            <p:ph type="sldImg"/>
+          </p:nvPr>
+        </p:nvSpPr>
+        <p:spPr bwMode="auto">
+          <a:xfrm>
+            <a:off x="1312863" y="1027113"/>
+            <a:ext cx="4933950" cy="3700462"/>
+          </a:xfrm>
+          <a:prstGeom prst="rect">
+            <a:avLst/>
+          </a:prstGeom>
+          <a:solidFill>
+            <a:srgbClr val="FFFFFF"/>
+          </a:solidFill>
+          <a:ln>
+            <a:solidFill>
+              <a:srgbClr val="000000"/>
+            </a:solidFill>
+            <a:miter lim="800000"/>
+            <a:headEnd/>
+            <a:tailEnd/>
+          </a:ln>
+          <a:extLst>
+            <a:ext uri="{AF507438-7753-43E0-B8FC-AC1667EBCBE1}">
+              <a14:hiddenEffects xmlns:a14="http://schemas.microsoft.com/office/drawing/2010/main">
+                <a:effectLst>
+                  <a:outerShdw dist="35921" dir="2700000" algn="ctr" rotWithShape="0">
+                    <a:srgbClr val="808080"/>
+                  </a:outerShdw>
+                </a:effectLst>
+              </a14:hiddenEffects>
+            </a:ext>
+          </a:extLst>
+        </p:spPr>
+      </p:sp>
+      <p:sp>
+        <p:nvSpPr>
+          <p:cNvPr id="25602" name="Rectangle 2"/>
+          <p:cNvSpPr txBox="1">
+            <a:spLocks noGrp="1" noChangeArrowheads="1"/>
+          </p:cNvSpPr>
+          <p:nvPr>
+            <p:ph type="body" idx="1"/>
+          </p:nvPr>
+        </p:nvSpPr>
+        <p:spPr bwMode="auto">
+          <a:xfrm>
+            <a:off x="1169988" y="5086350"/>
+            <a:ext cx="5226050" cy="4106863"/>
+          </a:xfrm>
+          <a:prstGeom prst="rect">
+            <a:avLst/>
+          </a:prstGeom>
+          <a:noFill/>
+          <a:ln/>
+          <a:extLst>
+            <a:ext uri="{909E8E84-426E-40DD-AFC4-6F175D3DCCD1}">
+              <a14:hiddenFill xmlns:a14="http://schemas.microsoft.com/office/drawing/2010/main">
+                <a:solidFill>
+                  <a:srgbClr val="FFFFFF"/>
+                </a:solidFill>
+              </a14:hiddenFill>
+            </a:ext>
+            <a:ext uri="{91240B29-F687-4F45-9708-019B960494DF}">
+              <a14:hiddenLine xmlns:a14="http://schemas.microsoft.com/office/drawing/2010/main" w="9525" cap="flat">
+                <a:solidFill>
+                  <a:srgbClr val="808080"/>
+                </a:solidFill>
+                <a:round/>
+                <a:headEnd/>
+                <a:tailEnd/>
+              </a14:hiddenLine>
+            </a:ext>
+            <a:ext uri="{AF507438-7753-43E0-B8FC-AC1667EBCBE1}">
+              <a14:hiddenEffects xmlns:a14="http://schemas.microsoft.com/office/drawing/2010/main">
+                <a:effectLst>
+                  <a:outerShdw dist="35921" dir="2700000" algn="ctr" rotWithShape="0">
+                    <a:srgbClr val="808080"/>
+                  </a:outerShdw>
+                </a:effectLst>
+              </a14:hiddenEffects>
+            </a:ext>
+          </a:extLst>
+        </p:spPr>
+        <p:txBody>
+          <a:bodyPr wrap="none" anchor="ctr"/>
+          <a:lstStyle/>
+          <a:p>
+            <a:endParaRPr lang="es-ES" altLang="es-ES"/>
+          </a:p>
+        </p:txBody>
+      </p:sp>
+    </p:spTree>
+    <p:extLst>
+      <p:ext uri="{BB962C8B-B14F-4D97-AF65-F5344CB8AC3E}">
+        <p14:creationId xmlns:p14="http://schemas.microsoft.com/office/powerpoint/2010/main" val="2025402897"/>
       </p:ext>
     </p:extLst>
   </p:cSld>
@@ -17386,15 +17248,7 @@
           <a:effectLst>
             <a:reflection blurRad="12700" stA="38000" endPos="28000" dist="5000" dir="5400000" sy="-100000" algn="bl" rotWithShape="0"/>
           </a:effectLst>
-          <a:extLst>
-            <a:ext uri="{909E8E84-426E-40DD-AFC4-6F175D3DCCD1}">
-              <a14:hiddenFill xmlns:a14="http://schemas.microsoft.com/office/drawing/2010/main">
-                <a:solidFill>
-                  <a:srgbClr val="FFFFFF"/>
-                </a:solidFill>
-              </a14:hiddenFill>
-            </a:ext>
-          </a:extLst>
+          <a:extLst/>
         </p:spPr>
       </p:pic>
     </p:spTree>
@@ -17413,7 +17267,7 @@
   <p:timing>
     <p:tnLst>
       <p:par>
-        <p:cTn id="1" dur="indefinite" nodeType="tmRoot">
+        <p:cTn id="1" dur="indefinite" restart="never" nodeType="tmRoot">
           <p:childTnLst>
             <p:seq concurrent="1" nextAc="seek">
               <p:cTn id="2" dur="0" nodeType="mainSeq"/>
@@ -17441,338 +17295,6 @@
 </file>
 
 <file path=ppt/slides/slide10.xml><?xml version="1.0" encoding="utf-8"?>
-<p:sld xmlns:a="http://schemas.openxmlformats.org/drawingml/2006/main" xmlns:r="http://schemas.openxmlformats.org/officeDocument/2006/relationships" xmlns:p="http://schemas.openxmlformats.org/presentationml/2006/main">
-  <p:cSld>
-    <p:spTree>
-      <p:nvGrpSpPr>
-        <p:cNvPr id="1" name=""/>
-        <p:cNvGrpSpPr/>
-        <p:nvPr/>
-      </p:nvGrpSpPr>
-      <p:grpSpPr>
-        <a:xfrm>
-          <a:off x="0" y="0"/>
-          <a:ext cx="0" cy="0"/>
-          <a:chOff x="0" y="0"/>
-          <a:chExt cx="0" cy="0"/>
-        </a:xfrm>
-      </p:grpSpPr>
-      <p:sp>
-        <p:nvSpPr>
-          <p:cNvPr id="13313" name="Rectangle 1"/>
-          <p:cNvSpPr>
-            <a:spLocks noGrp="1" noChangeArrowheads="1"/>
-          </p:cNvSpPr>
-          <p:nvPr>
-            <p:ph type="title"/>
-          </p:nvPr>
-        </p:nvSpPr>
-        <p:spPr>
-          <a:xfrm>
-            <a:off x="672024" y="829016"/>
-            <a:ext cx="7808914" cy="1016996"/>
-          </a:xfrm>
-          <a:ln/>
-        </p:spPr>
-        <p:txBody>
-          <a:bodyPr vert="horz" wrap="square" lIns="90000" tIns="33188" rIns="90000" bIns="46800" numCol="1" anchor="b" anchorCtr="0" compatLnSpc="1">
-            <a:prstTxWarp prst="textNoShape">
-              <a:avLst/>
-            </a:prstTxWarp>
-          </a:bodyPr>
-          <a:lstStyle/>
-          <a:p>
-            <a:pPr>
-              <a:tabLst>
-                <a:tab pos="680973" algn="l"/>
-                <a:tab pos="1361945" algn="l"/>
-                <a:tab pos="2042918" algn="l"/>
-                <a:tab pos="2723891" algn="l"/>
-                <a:tab pos="3404864" algn="l"/>
-                <a:tab pos="4085836" algn="l"/>
-                <a:tab pos="4766809" algn="l"/>
-                <a:tab pos="5447782" algn="l"/>
-                <a:tab pos="6128755" algn="l"/>
-                <a:tab pos="6809727" algn="l"/>
-                <a:tab pos="7490700" algn="l"/>
-              </a:tabLst>
-            </a:pPr>
-            <a:r>
-              <a:rPr lang="es-ES" altLang="es-ES" sz="3763" err="1"/>
-              <a:t>Sekuentzia</a:t>
-            </a:r>
-            <a:r>
-              <a:rPr lang="es-ES" altLang="es-ES" sz="3763"/>
-              <a:t> Diagrama</a:t>
-            </a:r>
-          </a:p>
-        </p:txBody>
-      </p:sp>
-      <p:pic>
-        <p:nvPicPr>
-          <p:cNvPr id="13314" name="Picture 2"/>
-          <p:cNvPicPr>
-            <a:picLocks noChangeAspect="1" noChangeArrowheads="1"/>
-          </p:cNvPicPr>
-          <p:nvPr/>
-        </p:nvPicPr>
-        <p:blipFill rotWithShape="1">
-          <a:blip r:embed="rId3">
-            <a:extLst>
-              <a:ext uri="{28A0092B-C50C-407E-A947-70E740481C1C}">
-                <a14:useLocalDpi xmlns:a14="http://schemas.microsoft.com/office/drawing/2010/main" val="0"/>
-              </a:ext>
-            </a:extLst>
-          </a:blip>
-          <a:srcRect r="39984" b="86458"/>
-          <a:stretch/>
-        </p:blipFill>
-        <p:spPr bwMode="auto">
-          <a:xfrm>
-            <a:off x="507659" y="2141959"/>
-            <a:ext cx="8439986" cy="4073927"/>
-          </a:xfrm>
-          <a:prstGeom prst="rect">
-            <a:avLst/>
-          </a:prstGeom>
-          <a:noFill/>
-          <a:ln>
-            <a:noFill/>
-          </a:ln>
-          <a:effectLst/>
-          <a:extLst>
-            <a:ext uri="{909E8E84-426E-40DD-AFC4-6F175D3DCCD1}">
-              <a14:hiddenFill xmlns:a14="http://schemas.microsoft.com/office/drawing/2010/main">
-                <a:blipFill dpi="0" rotWithShape="0">
-                  <a:blip/>
-                  <a:srcRect r="39984" b="-21335"/>
-                  <a:stretch>
-                    <a:fillRect/>
-                  </a:stretch>
-                </a:blipFill>
-              </a14:hiddenFill>
-            </a:ext>
-            <a:ext uri="{91240B29-F687-4F45-9708-019B960494DF}">
-              <a14:hiddenLine xmlns:a14="http://schemas.microsoft.com/office/drawing/2010/main" w="9525" cap="flat">
-                <a:solidFill>
-                  <a:srgbClr val="808080"/>
-                </a:solidFill>
-                <a:round/>
-                <a:headEnd/>
-                <a:tailEnd/>
-              </a14:hiddenLine>
-            </a:ext>
-            <a:ext uri="{AF507438-7753-43E0-B8FC-AC1667EBCBE1}">
-              <a14:hiddenEffects xmlns:a14="http://schemas.microsoft.com/office/drawing/2010/main">
-                <a:effectLst>
-                  <a:outerShdw dist="35921" dir="2700000" algn="ctr" rotWithShape="0">
-                    <a:srgbClr val="808080"/>
-                  </a:outerShdw>
-                </a:effectLst>
-              </a14:hiddenEffects>
-            </a:ext>
-          </a:extLst>
-        </p:spPr>
-      </p:pic>
-      <p:pic>
-        <p:nvPicPr>
-          <p:cNvPr id="4" name="Picture 2" descr="http://i.gyazo.com/bb2a5a97d5df6c22afda21d27924449e.png"/>
-          <p:cNvPicPr>
-            <a:picLocks noChangeAspect="1" noChangeArrowheads="1"/>
-          </p:cNvPicPr>
-          <p:nvPr/>
-        </p:nvPicPr>
-        <p:blipFill>
-          <a:blip r:embed="rId4" cstate="print">
-            <a:extLst>
-              <a:ext uri="{28A0092B-C50C-407E-A947-70E740481C1C}">
-                <a14:useLocalDpi xmlns:a14="http://schemas.microsoft.com/office/drawing/2010/main" val="0"/>
-              </a:ext>
-            </a:extLst>
-          </a:blip>
-          <a:srcRect/>
-          <a:stretch>
-            <a:fillRect/>
-          </a:stretch>
-        </p:blipFill>
-        <p:spPr bwMode="auto">
-          <a:xfrm>
-            <a:off x="7308304" y="117434"/>
-            <a:ext cx="1474650" cy="1876552"/>
-          </a:xfrm>
-          <a:prstGeom prst="rect">
-            <a:avLst/>
-          </a:prstGeom>
-          <a:noFill/>
-          <a:extLst>
-            <a:ext uri="{909E8E84-426E-40DD-AFC4-6F175D3DCCD1}">
-              <a14:hiddenFill xmlns:a14="http://schemas.microsoft.com/office/drawing/2010/main">
-                <a:solidFill>
-                  <a:srgbClr val="FFFFFF"/>
-                </a:solidFill>
-              </a14:hiddenFill>
-            </a:ext>
-          </a:extLst>
-        </p:spPr>
-      </p:pic>
-      <p:sp>
-        <p:nvSpPr>
-          <p:cNvPr id="5" name="Llamada rectangular redondeada 4"/>
-          <p:cNvSpPr/>
-          <p:nvPr/>
-        </p:nvSpPr>
-        <p:spPr bwMode="auto">
-          <a:xfrm>
-            <a:off x="2339752" y="347824"/>
-            <a:ext cx="4800168" cy="854002"/>
-          </a:xfrm>
-          <a:prstGeom prst="wedgeRoundRectCallout">
-            <a:avLst>
-              <a:gd name="adj1" fmla="val 50106"/>
-              <a:gd name="adj2" fmla="val 76173"/>
-              <a:gd name="adj3" fmla="val 16667"/>
-            </a:avLst>
-          </a:prstGeom>
-          <a:solidFill>
-            <a:schemeClr val="bg1"/>
-          </a:solidFill>
-          <a:ln w="9525" cap="flat" cmpd="sng" algn="ctr">
-            <a:solidFill>
-              <a:schemeClr val="tx1"/>
-            </a:solidFill>
-            <a:prstDash val="solid"/>
-            <a:round/>
-            <a:headEnd type="none" w="med" len="med"/>
-            <a:tailEnd type="none" w="med" len="med"/>
-          </a:ln>
-          <a:effectLst/>
-          <a:extLst/>
-        </p:spPr>
-        <p:txBody>
-          <a:bodyPr vert="horz" wrap="square" lIns="91440" tIns="45720" rIns="91440" bIns="45720" numCol="1" rtlCol="0" anchor="t" anchorCtr="0" compatLnSpc="1">
-            <a:prstTxWarp prst="textNoShape">
-              <a:avLst/>
-            </a:prstTxWarp>
-          </a:bodyPr>
-          <a:lstStyle/>
-          <a:p>
-            <a:pPr marL="0" marR="0" indent="0" algn="l" defTabSz="449263" rtl="0" eaLnBrk="1" fontAlgn="base" latinLnBrk="0" hangingPunct="1">
-              <a:lnSpc>
-                <a:spcPct val="100000"/>
-              </a:lnSpc>
-              <a:spcBef>
-                <a:spcPct val="0"/>
-              </a:spcBef>
-              <a:spcAft>
-                <a:spcPct val="0"/>
-              </a:spcAft>
-              <a:buClr>
-                <a:srgbClr val="000000"/>
-              </a:buClr>
-              <a:buSzPct val="100000"/>
-              <a:buFont typeface="Times New Roman" pitchFamily="16" charset="0"/>
-              <a:buNone/>
-              <a:tabLst/>
-            </a:pPr>
-            <a:endParaRPr kumimoji="0" lang="es-ES" sz="2400" b="0" i="0" u="none" strike="noStrike" cap="none" normalizeH="0" baseline="0" smtClean="0">
-              <a:ln>
-                <a:noFill/>
-              </a:ln>
-              <a:solidFill>
-                <a:schemeClr val="bg1"/>
-              </a:solidFill>
-              <a:effectLst/>
-              <a:latin typeface="Verdana" pitchFamily="32" charset="0"/>
-            </a:endParaRPr>
-          </a:p>
-        </p:txBody>
-      </p:sp>
-      <p:sp>
-        <p:nvSpPr>
-          <p:cNvPr id="6" name="CuadroTexto 5"/>
-          <p:cNvSpPr txBox="1"/>
-          <p:nvPr/>
-        </p:nvSpPr>
-        <p:spPr>
-          <a:xfrm>
-            <a:off x="2411760" y="347824"/>
-            <a:ext cx="4728160" cy="707886"/>
-          </a:xfrm>
-          <a:prstGeom prst="rect">
-            <a:avLst/>
-          </a:prstGeom>
-          <a:noFill/>
-        </p:spPr>
-        <p:txBody>
-          <a:bodyPr wrap="square" rtlCol="0">
-            <a:spAutoFit/>
-          </a:bodyPr>
-          <a:lstStyle/>
-          <a:p>
-            <a:r>
-              <a:rPr lang="es-ES" sz="2000" smtClean="0">
-                <a:solidFill>
-                  <a:schemeClr val="accent6">
-                    <a:lumMod val="75000"/>
-                  </a:schemeClr>
-                </a:solidFill>
-              </a:rPr>
-              <a:t>Sekuentzia-diagrama zatitu dugu zuen ikusmenaren onuragatik </a:t>
-            </a:r>
-            <a:endParaRPr lang="es-ES" sz="2000">
-              <a:solidFill>
-                <a:schemeClr val="accent6">
-                  <a:lumMod val="75000"/>
-                </a:schemeClr>
-              </a:solidFill>
-            </a:endParaRPr>
-          </a:p>
-        </p:txBody>
-      </p:sp>
-    </p:spTree>
-    <p:extLst>
-      <p:ext uri="{BB962C8B-B14F-4D97-AF65-F5344CB8AC3E}">
-        <p14:creationId xmlns:p14="http://schemas.microsoft.com/office/powerpoint/2010/main" val="3464994919"/>
-      </p:ext>
-    </p:extLst>
-  </p:cSld>
-  <p:clrMapOvr>
-    <a:masterClrMapping/>
-  </p:clrMapOvr>
-  <p:transition>
-    <p:wipe dir="u"/>
-  </p:transition>
-  <p:timing>
-    <p:tnLst>
-      <p:par>
-        <p:cTn id="1" dur="indefinite" nodeType="tmRoot">
-          <p:childTnLst>
-            <p:seq concurrent="1" nextAc="seek">
-              <p:cTn id="2" dur="0" nodeType="mainSeq"/>
-              <p:prevCondLst>
-                <p:cond evt="onPrev" delay="0">
-                  <p:tgtEl>
-                    <p:sldTgt/>
-                  </p:tgtEl>
-                </p:cond>
-              </p:prevCondLst>
-              <p:nextCondLst>
-                <p:cond evt="onNext" delay="0">
-                  <p:tgtEl>
-                    <p:sldTgt/>
-                  </p:tgtEl>
-                </p:cond>
-              </p:nextCondLst>
-            </p:seq>
-          </p:childTnLst>
-        </p:cTn>
-      </p:par>
-    </p:tnLst>
-  </p:timing>
-</p:sld>
-</file>
-
-<file path=ppt/slides/slide11.xml><?xml version="1.0" encoding="utf-8"?>
 <p:sld xmlns:a="http://schemas.openxmlformats.org/drawingml/2006/main" xmlns:r="http://schemas.openxmlformats.org/officeDocument/2006/relationships" xmlns:p="http://schemas.openxmlformats.org/presentationml/2006/main">
   <p:cSld>
     <p:spTree>
@@ -17945,7 +17467,7 @@
   <p:timing>
     <p:tnLst>
       <p:par>
-        <p:cTn id="1" dur="indefinite" nodeType="tmRoot">
+        <p:cTn id="1" dur="indefinite" restart="never" nodeType="tmRoot">
           <p:childTnLst>
             <p:seq concurrent="1" nextAc="seek">
               <p:cTn id="2" dur="0" nodeType="mainSeq"/>
@@ -17972,7 +17494,7 @@
 </p:sld>
 </file>
 
-<file path=ppt/slides/slide12.xml><?xml version="1.0" encoding="utf-8"?>
+<file path=ppt/slides/slide11.xml><?xml version="1.0" encoding="utf-8"?>
 <p:sld xmlns:a="http://schemas.openxmlformats.org/drawingml/2006/main" xmlns:r="http://schemas.openxmlformats.org/officeDocument/2006/relationships" xmlns:p="http://schemas.openxmlformats.org/presentationml/2006/main">
   <p:cSld>
     <p:spTree>
@@ -18102,7 +17624,7 @@
   <p:timing>
     <p:tnLst>
       <p:par>
-        <p:cTn id="1" dur="indefinite" nodeType="tmRoot">
+        <p:cTn id="1" dur="indefinite" restart="never" nodeType="tmRoot">
           <p:childTnLst>
             <p:seq concurrent="1" nextAc="seek">
               <p:cTn id="2" dur="0" nodeType="mainSeq"/>
@@ -18129,7 +17651,7 @@
 </p:sld>
 </file>
 
-<file path=ppt/slides/slide13.xml><?xml version="1.0" encoding="utf-8"?>
+<file path=ppt/slides/slide12.xml><?xml version="1.0" encoding="utf-8"?>
 <p:sld xmlns:a="http://schemas.openxmlformats.org/drawingml/2006/main" xmlns:r="http://schemas.openxmlformats.org/officeDocument/2006/relationships" xmlns:p="http://schemas.openxmlformats.org/presentationml/2006/main">
   <p:cSld>
     <p:spTree>
@@ -18259,7 +17781,7 @@
   <p:timing>
     <p:tnLst>
       <p:par>
-        <p:cTn id="1" dur="indefinite" nodeType="tmRoot">
+        <p:cTn id="1" dur="indefinite" restart="never" nodeType="tmRoot">
           <p:childTnLst>
             <p:seq concurrent="1" nextAc="seek">
               <p:cTn id="2" dur="0" nodeType="mainSeq"/>
@@ -18286,7 +17808,7 @@
 </p:sld>
 </file>
 
-<file path=ppt/slides/slide14.xml><?xml version="1.0" encoding="utf-8"?>
+<file path=ppt/slides/slide13.xml><?xml version="1.0" encoding="utf-8"?>
 <p:sld xmlns:a="http://schemas.openxmlformats.org/drawingml/2006/main" xmlns:r="http://schemas.openxmlformats.org/officeDocument/2006/relationships" xmlns:p="http://schemas.openxmlformats.org/presentationml/2006/main">
   <p:cSld>
     <p:spTree>
@@ -18416,7 +17938,7 @@
   <p:timing>
     <p:tnLst>
       <p:par>
-        <p:cTn id="1" dur="indefinite" nodeType="tmRoot">
+        <p:cTn id="1" dur="indefinite" restart="never" nodeType="tmRoot">
           <p:childTnLst>
             <p:seq concurrent="1" nextAc="seek">
               <p:cTn id="2" dur="0" nodeType="mainSeq"/>
@@ -18443,7 +17965,7 @@
 </p:sld>
 </file>
 
-<file path=ppt/slides/slide15.xml><?xml version="1.0" encoding="utf-8"?>
+<file path=ppt/slides/slide14.xml><?xml version="1.0" encoding="utf-8"?>
 <p:sld xmlns:a="http://schemas.openxmlformats.org/drawingml/2006/main" xmlns:r="http://schemas.openxmlformats.org/officeDocument/2006/relationships" xmlns:p="http://schemas.openxmlformats.org/presentationml/2006/main">
   <p:cSld>
     <p:spTree>
@@ -18575,7 +18097,7 @@
   <p:timing>
     <p:tnLst>
       <p:par>
-        <p:cTn id="1" dur="indefinite" nodeType="tmRoot">
+        <p:cTn id="1" dur="indefinite" restart="never" nodeType="tmRoot">
           <p:childTnLst>
             <p:seq concurrent="1" nextAc="seek">
               <p:cTn id="2" dur="0" nodeType="mainSeq"/>
@@ -18602,7 +18124,7 @@
 </p:sld>
 </file>
 
-<file path=ppt/slides/slide16.xml><?xml version="1.0" encoding="utf-8"?>
+<file path=ppt/slides/slide15.xml><?xml version="1.0" encoding="utf-8"?>
 <p:sld xmlns:a="http://schemas.openxmlformats.org/drawingml/2006/main" xmlns:r="http://schemas.openxmlformats.org/officeDocument/2006/relationships" xmlns:p="http://schemas.openxmlformats.org/presentationml/2006/main">
   <p:cSld>
     <p:spTree>
@@ -18734,7 +18256,7 @@
   <p:timing>
     <p:tnLst>
       <p:par>
-        <p:cTn id="1" dur="indefinite" nodeType="tmRoot">
+        <p:cTn id="1" dur="indefinite" restart="never" nodeType="tmRoot">
           <p:childTnLst>
             <p:seq concurrent="1" nextAc="seek">
               <p:cTn id="2" dur="0" nodeType="mainSeq"/>
@@ -18761,7 +18283,7 @@
 </p:sld>
 </file>
 
-<file path=ppt/slides/slide17.xml><?xml version="1.0" encoding="utf-8"?>
+<file path=ppt/slides/slide16.xml><?xml version="1.0" encoding="utf-8"?>
 <p:sld xmlns:a="http://schemas.openxmlformats.org/drawingml/2006/main" xmlns:r="http://schemas.openxmlformats.org/officeDocument/2006/relationships" xmlns:p="http://schemas.openxmlformats.org/presentationml/2006/main">
   <p:cSld>
     <p:spTree>
@@ -19041,7 +18563,7 @@
 </p:sld>
 </file>
 
-<file path=ppt/slides/slide18.xml><?xml version="1.0" encoding="utf-8"?>
+<file path=ppt/slides/slide17.xml><?xml version="1.0" encoding="utf-8"?>
 <p:sld xmlns:a="http://schemas.openxmlformats.org/drawingml/2006/main" xmlns:r="http://schemas.openxmlformats.org/officeDocument/2006/relationships" xmlns:p="http://schemas.openxmlformats.org/presentationml/2006/main">
   <p:cSld>
     <p:spTree>
@@ -19743,7 +19265,7 @@
 </p:sld>
 </file>
 
-<file path=ppt/slides/slide19.xml><?xml version="1.0" encoding="utf-8"?>
+<file path=ppt/slides/slide18.xml><?xml version="1.0" encoding="utf-8"?>
 <p:sld xmlns:a="http://schemas.openxmlformats.org/drawingml/2006/main" xmlns:r="http://schemas.openxmlformats.org/officeDocument/2006/relationships" xmlns:p="http://schemas.openxmlformats.org/presentationml/2006/main">
   <p:cSld>
     <p:spTree>
@@ -19856,6 +19378,178 @@
     <p:extLst>
       <p:ext uri="{BB962C8B-B14F-4D97-AF65-F5344CB8AC3E}">
         <p14:creationId xmlns:p14="http://schemas.microsoft.com/office/powerpoint/2010/main" val="2126349796"/>
+      </p:ext>
+    </p:extLst>
+  </p:cSld>
+  <p:clrMapOvr>
+    <a:masterClrMapping/>
+  </p:clrMapOvr>
+  <p:timing>
+    <p:tnLst>
+      <p:par>
+        <p:cTn id="1" dur="indefinite" restart="never" nodeType="tmRoot"/>
+      </p:par>
+    </p:tnLst>
+  </p:timing>
+</p:sld>
+</file>
+
+<file path=ppt/slides/slide19.xml><?xml version="1.0" encoding="utf-8"?>
+<p:sld xmlns:a="http://schemas.openxmlformats.org/drawingml/2006/main" xmlns:r="http://schemas.openxmlformats.org/officeDocument/2006/relationships" xmlns:p="http://schemas.openxmlformats.org/presentationml/2006/main">
+  <p:cSld>
+    <p:spTree>
+      <p:nvGrpSpPr>
+        <p:cNvPr id="1" name=""/>
+        <p:cNvGrpSpPr/>
+        <p:nvPr/>
+      </p:nvGrpSpPr>
+      <p:grpSpPr>
+        <a:xfrm>
+          <a:off x="0" y="0"/>
+          <a:ext cx="0" cy="0"/>
+          <a:chOff x="0" y="0"/>
+          <a:chExt cx="0" cy="0"/>
+        </a:xfrm>
+      </p:grpSpPr>
+      <p:sp>
+        <p:nvSpPr>
+          <p:cNvPr id="2" name="Título 1"/>
+          <p:cNvSpPr>
+            <a:spLocks noGrp="1"/>
+          </p:cNvSpPr>
+          <p:nvPr>
+            <p:ph type="title"/>
+          </p:nvPr>
+        </p:nvSpPr>
+        <p:spPr/>
+        <p:txBody>
+          <a:bodyPr/>
+          <a:lstStyle/>
+          <a:p>
+            <a:r>
+              <a:rPr lang="es-ES" smtClean="0"/>
+              <a:t>Ondorioak</a:t>
+            </a:r>
+            <a:endParaRPr lang="es-ES"/>
+          </a:p>
+        </p:txBody>
+      </p:sp>
+      <p:sp>
+        <p:nvSpPr>
+          <p:cNvPr id="3" name="Marcador de contenido 2"/>
+          <p:cNvSpPr>
+            <a:spLocks noGrp="1"/>
+          </p:cNvSpPr>
+          <p:nvPr>
+            <p:ph idx="1"/>
+          </p:nvPr>
+        </p:nvSpPr>
+        <p:spPr>
+          <a:xfrm>
+            <a:off x="865561" y="1844824"/>
+            <a:ext cx="8332788" cy="4600575"/>
+          </a:xfrm>
+        </p:spPr>
+        <p:txBody>
+          <a:bodyPr/>
+          <a:lstStyle/>
+          <a:p>
+            <a:r>
+              <a:rPr lang="es-ES" sz="2800" smtClean="0"/>
+              <a:t>Proiektuaren zailtasuna: Egokia</a:t>
+            </a:r>
+          </a:p>
+          <a:p>
+            <a:r>
+              <a:rPr lang="es-ES" sz="2800" smtClean="0"/>
+              <a:t>Erabilitako jakintzak: Klasean emandako guztiak</a:t>
+            </a:r>
+          </a:p>
+          <a:p>
+            <a:r>
+              <a:rPr lang="es-ES" sz="2800" smtClean="0"/>
+              <a:t>Arazoen konponbidea lortzea: </a:t>
+            </a:r>
+          </a:p>
+          <a:p>
+            <a:pPr marL="0" indent="0">
+              <a:buNone/>
+            </a:pPr>
+            <a:r>
+              <a:rPr lang="es-ES" sz="2800"/>
+              <a:t>	</a:t>
+            </a:r>
+            <a:r>
+              <a:rPr lang="es-ES" sz="2800" smtClean="0"/>
+              <a:t>Guztion artean posible</a:t>
+            </a:r>
+          </a:p>
+          <a:p>
+            <a:r>
+              <a:rPr lang="es-ES" sz="2800" smtClean="0"/>
+              <a:t>Bug bat konpondu </a:t>
+            </a:r>
+            <a:r>
+              <a:rPr lang="es-ES" sz="2800" smtClean="0">
+                <a:sym typeface="Wingdings" panose="05000000000000000000" pitchFamily="2" charset="2"/>
+              </a:rPr>
+              <a:t> Milaka bug</a:t>
+            </a:r>
+          </a:p>
+          <a:p>
+            <a:r>
+              <a:rPr lang="es-ES" sz="2800" smtClean="0"/>
+              <a:t>Oso goiz hasi: Denbora asko jokoa pulitzeko, eta irakasleei galdera asko egiteko denbora</a:t>
+            </a:r>
+            <a:endParaRPr lang="es-ES" sz="2800"/>
+          </a:p>
+        </p:txBody>
+      </p:sp>
+      <p:pic>
+        <p:nvPicPr>
+          <p:cNvPr id="7" name="Picture 4" descr="http://i.ytimg.com/vi/cpsbfxbg6gw/maxresdefault.jpg"/>
+          <p:cNvPicPr>
+            <a:picLocks noChangeAspect="1" noChangeArrowheads="1"/>
+          </p:cNvPicPr>
+          <p:nvPr/>
+        </p:nvPicPr>
+        <p:blipFill>
+          <a:blip r:embed="rId2" cstate="print">
+            <a:extLst>
+              <a:ext uri="{28A0092B-C50C-407E-A947-70E740481C1C}">
+                <a14:useLocalDpi xmlns:a14="http://schemas.microsoft.com/office/drawing/2010/main" val="0"/>
+              </a:ext>
+            </a:extLst>
+          </a:blip>
+          <a:srcRect/>
+          <a:stretch>
+            <a:fillRect/>
+          </a:stretch>
+        </p:blipFill>
+        <p:spPr bwMode="auto">
+          <a:xfrm>
+            <a:off x="6156176" y="2924944"/>
+            <a:ext cx="2771800" cy="1559137"/>
+          </a:xfrm>
+          <a:prstGeom prst="rect">
+            <a:avLst/>
+          </a:prstGeom>
+          <a:noFill/>
+          <a:extLst>
+            <a:ext uri="{909E8E84-426E-40DD-AFC4-6F175D3DCCD1}">
+              <a14:hiddenFill xmlns:a14="http://schemas.microsoft.com/office/drawing/2010/main">
+                <a:solidFill>
+                  <a:srgbClr val="FFFFFF"/>
+                </a:solidFill>
+              </a14:hiddenFill>
+            </a:ext>
+          </a:extLst>
+        </p:spPr>
+      </p:pic>
+    </p:spTree>
+    <p:extLst>
+      <p:ext uri="{BB962C8B-B14F-4D97-AF65-F5344CB8AC3E}">
+        <p14:creationId xmlns:p14="http://schemas.microsoft.com/office/powerpoint/2010/main" val="1126865276"/>
       </p:ext>
     </p:extLst>
   </p:cSld>
@@ -20221,7 +19915,7 @@
   <p:timing>
     <p:tnLst>
       <p:par>
-        <p:cTn id="1" dur="indefinite" nodeType="tmRoot">
+        <p:cTn id="1" dur="indefinite" restart="never" nodeType="tmRoot">
           <p:childTnLst>
             <p:seq concurrent="1" nextAc="seek">
               <p:cTn id="2" dur="0" nodeType="mainSeq"/>
@@ -20249,178 +19943,6 @@
 </file>
 
 <file path=ppt/slides/slide20.xml><?xml version="1.0" encoding="utf-8"?>
-<p:sld xmlns:a="http://schemas.openxmlformats.org/drawingml/2006/main" xmlns:r="http://schemas.openxmlformats.org/officeDocument/2006/relationships" xmlns:p="http://schemas.openxmlformats.org/presentationml/2006/main">
-  <p:cSld>
-    <p:spTree>
-      <p:nvGrpSpPr>
-        <p:cNvPr id="1" name=""/>
-        <p:cNvGrpSpPr/>
-        <p:nvPr/>
-      </p:nvGrpSpPr>
-      <p:grpSpPr>
-        <a:xfrm>
-          <a:off x="0" y="0"/>
-          <a:ext cx="0" cy="0"/>
-          <a:chOff x="0" y="0"/>
-          <a:chExt cx="0" cy="0"/>
-        </a:xfrm>
-      </p:grpSpPr>
-      <p:sp>
-        <p:nvSpPr>
-          <p:cNvPr id="2" name="Título 1"/>
-          <p:cNvSpPr>
-            <a:spLocks noGrp="1"/>
-          </p:cNvSpPr>
-          <p:nvPr>
-            <p:ph type="title"/>
-          </p:nvPr>
-        </p:nvSpPr>
-        <p:spPr/>
-        <p:txBody>
-          <a:bodyPr/>
-          <a:lstStyle/>
-          <a:p>
-            <a:r>
-              <a:rPr lang="es-ES" smtClean="0"/>
-              <a:t>Ondorioak</a:t>
-            </a:r>
-            <a:endParaRPr lang="es-ES"/>
-          </a:p>
-        </p:txBody>
-      </p:sp>
-      <p:sp>
-        <p:nvSpPr>
-          <p:cNvPr id="3" name="Marcador de contenido 2"/>
-          <p:cNvSpPr>
-            <a:spLocks noGrp="1"/>
-          </p:cNvSpPr>
-          <p:nvPr>
-            <p:ph idx="1"/>
-          </p:nvPr>
-        </p:nvSpPr>
-        <p:spPr>
-          <a:xfrm>
-            <a:off x="865561" y="1844824"/>
-            <a:ext cx="8332788" cy="4600575"/>
-          </a:xfrm>
-        </p:spPr>
-        <p:txBody>
-          <a:bodyPr/>
-          <a:lstStyle/>
-          <a:p>
-            <a:r>
-              <a:rPr lang="es-ES" sz="2800" smtClean="0"/>
-              <a:t>Proiektuaren zailtasuna: Egokia</a:t>
-            </a:r>
-          </a:p>
-          <a:p>
-            <a:r>
-              <a:rPr lang="es-ES" sz="2800" smtClean="0"/>
-              <a:t>Erabilitako jakintzak: Klasean emandako guztiak</a:t>
-            </a:r>
-          </a:p>
-          <a:p>
-            <a:r>
-              <a:rPr lang="es-ES" sz="2800" smtClean="0"/>
-              <a:t>Arazoen konponbidea lortzea: </a:t>
-            </a:r>
-          </a:p>
-          <a:p>
-            <a:pPr marL="0" indent="0">
-              <a:buNone/>
-            </a:pPr>
-            <a:r>
-              <a:rPr lang="es-ES" sz="2800"/>
-              <a:t>	</a:t>
-            </a:r>
-            <a:r>
-              <a:rPr lang="es-ES" sz="2800" smtClean="0"/>
-              <a:t>Guztion artean posible</a:t>
-            </a:r>
-          </a:p>
-          <a:p>
-            <a:r>
-              <a:rPr lang="es-ES" sz="2800" smtClean="0"/>
-              <a:t>Bug bat konpondu </a:t>
-            </a:r>
-            <a:r>
-              <a:rPr lang="es-ES" sz="2800" smtClean="0">
-                <a:sym typeface="Wingdings" panose="05000000000000000000" pitchFamily="2" charset="2"/>
-              </a:rPr>
-              <a:t> Milaka bug</a:t>
-            </a:r>
-          </a:p>
-          <a:p>
-            <a:r>
-              <a:rPr lang="es-ES" sz="2800" smtClean="0"/>
-              <a:t>Oso goiz hasi: Denbora asko jokoa pulitzeko, eta irakasleei galdera asko egiteko denbora</a:t>
-            </a:r>
-            <a:endParaRPr lang="es-ES" sz="2800"/>
-          </a:p>
-        </p:txBody>
-      </p:sp>
-      <p:pic>
-        <p:nvPicPr>
-          <p:cNvPr id="7" name="Picture 4" descr="http://i.ytimg.com/vi/cpsbfxbg6gw/maxresdefault.jpg"/>
-          <p:cNvPicPr>
-            <a:picLocks noChangeAspect="1" noChangeArrowheads="1"/>
-          </p:cNvPicPr>
-          <p:nvPr/>
-        </p:nvPicPr>
-        <p:blipFill>
-          <a:blip r:embed="rId2" cstate="print">
-            <a:extLst>
-              <a:ext uri="{28A0092B-C50C-407E-A947-70E740481C1C}">
-                <a14:useLocalDpi xmlns:a14="http://schemas.microsoft.com/office/drawing/2010/main" val="0"/>
-              </a:ext>
-            </a:extLst>
-          </a:blip>
-          <a:srcRect/>
-          <a:stretch>
-            <a:fillRect/>
-          </a:stretch>
-        </p:blipFill>
-        <p:spPr bwMode="auto">
-          <a:xfrm>
-            <a:off x="6156176" y="2924944"/>
-            <a:ext cx="2771800" cy="1559137"/>
-          </a:xfrm>
-          <a:prstGeom prst="rect">
-            <a:avLst/>
-          </a:prstGeom>
-          <a:noFill/>
-          <a:extLst>
-            <a:ext uri="{909E8E84-426E-40DD-AFC4-6F175D3DCCD1}">
-              <a14:hiddenFill xmlns:a14="http://schemas.microsoft.com/office/drawing/2010/main">
-                <a:solidFill>
-                  <a:srgbClr val="FFFFFF"/>
-                </a:solidFill>
-              </a14:hiddenFill>
-            </a:ext>
-          </a:extLst>
-        </p:spPr>
-      </p:pic>
-    </p:spTree>
-    <p:extLst>
-      <p:ext uri="{BB962C8B-B14F-4D97-AF65-F5344CB8AC3E}">
-        <p14:creationId xmlns:p14="http://schemas.microsoft.com/office/powerpoint/2010/main" val="1126865276"/>
-      </p:ext>
-    </p:extLst>
-  </p:cSld>
-  <p:clrMapOvr>
-    <a:masterClrMapping/>
-  </p:clrMapOvr>
-  <p:timing>
-    <p:tnLst>
-      <p:par>
-        <p:cTn id="1" dur="indefinite" restart="never" nodeType="tmRoot"/>
-      </p:par>
-    </p:tnLst>
-  </p:timing>
-</p:sld>
-</file>
-
-<file path=ppt/slides/slide21.xml><?xml version="1.0" encoding="utf-8"?>
 <p:sld xmlns:a="http://schemas.openxmlformats.org/drawingml/2006/main" xmlns:r="http://schemas.openxmlformats.org/officeDocument/2006/relationships" xmlns:p="http://schemas.openxmlformats.org/presentationml/2006/main">
   <p:cSld>
     <p:spTree>
@@ -20727,11 +20249,11 @@
   <p:clrMapOvr>
     <a:masterClrMapping/>
   </p:clrMapOvr>
-  <mc:AlternateContent xmlns:mc="http://schemas.openxmlformats.org/markup-compatibility/2006">
-    <mc:Choice xmlns:p14="http://schemas.microsoft.com/office/powerpoint/2010/main" Requires="p14">
+  <mc:AlternateContent xmlns:mc="http://schemas.openxmlformats.org/markup-compatibility/2006" xmlns:p14="http://schemas.microsoft.com/office/powerpoint/2010/main">
+    <mc:Choice Requires="p14">
       <p:transition spd="slow" p14:dur="2000"/>
     </mc:Choice>
-    <mc:Fallback>
+    <mc:Fallback xmlns="">
       <p:transition spd="slow"/>
     </mc:Fallback>
   </mc:AlternateContent>
@@ -20906,7 +20428,7 @@
   <p:timing>
     <p:tnLst>
       <p:par>
-        <p:cTn id="1" dur="indefinite" nodeType="tmRoot">
+        <p:cTn id="1" dur="indefinite" restart="never" nodeType="tmRoot">
           <p:childTnLst>
             <p:seq concurrent="1" nextAc="seek">
               <p:cTn id="2" dur="0" nodeType="mainSeq"/>
@@ -21042,7 +20564,6 @@
               <a:rPr lang="es-ES" altLang="es-ES" sz="2400" smtClean="0"/>
               <a:t>Blackjackera jolasteko pausuak hauek dira:</a:t>
             </a:r>
-            <a:endParaRPr lang="es-ES" altLang="es-ES" sz="2400" smtClean="0"/>
           </a:p>
           <a:p>
             <a:pPr marL="406194" indent="-304646" algn="just">
@@ -21270,7 +20791,7 @@
   <p:timing>
     <p:tnLst>
       <p:par>
-        <p:cTn id="1" dur="indefinite" nodeType="tmRoot">
+        <p:cTn id="1" dur="indefinite" restart="never" nodeType="tmRoot">
           <p:childTnLst>
             <p:seq concurrent="1" nextAc="seek">
               <p:cTn id="2" dur="0" nodeType="mainSeq"/>
@@ -21298,956 +20819,6 @@
 </file>
 
 <file path=ppt/slides/slide5.xml><?xml version="1.0" encoding="utf-8"?>
-<p:sld xmlns:a="http://schemas.openxmlformats.org/drawingml/2006/main" xmlns:r="http://schemas.openxmlformats.org/officeDocument/2006/relationships" xmlns:p="http://schemas.openxmlformats.org/presentationml/2006/main">
-  <p:cSld>
-    <p:spTree>
-      <p:nvGrpSpPr>
-        <p:cNvPr id="1" name=""/>
-        <p:cNvGrpSpPr/>
-        <p:nvPr/>
-      </p:nvGrpSpPr>
-      <p:grpSpPr>
-        <a:xfrm>
-          <a:off x="0" y="0"/>
-          <a:ext cx="0" cy="0"/>
-          <a:chOff x="0" y="0"/>
-          <a:chExt cx="0" cy="0"/>
-        </a:xfrm>
-      </p:grpSpPr>
-      <p:sp>
-        <p:nvSpPr>
-          <p:cNvPr id="8193" name="Rectangle 1"/>
-          <p:cNvSpPr>
-            <a:spLocks noGrp="1" noChangeArrowheads="1"/>
-          </p:cNvSpPr>
-          <p:nvPr>
-            <p:ph type="title"/>
-          </p:nvPr>
-        </p:nvSpPr>
-        <p:spPr>
-          <a:xfrm>
-            <a:off x="672024" y="829016"/>
-            <a:ext cx="7808914" cy="1016996"/>
-          </a:xfrm>
-          <a:ln/>
-        </p:spPr>
-        <p:txBody>
-          <a:bodyPr vert="horz" wrap="square" lIns="90000" tIns="39826" rIns="90000" bIns="46800" numCol="1" anchor="b" anchorCtr="0" compatLnSpc="1">
-            <a:prstTxWarp prst="textNoShape">
-              <a:avLst/>
-            </a:prstTxWarp>
-          </a:bodyPr>
-          <a:lstStyle/>
-          <a:p>
-            <a:pPr>
-              <a:tabLst>
-                <a:tab pos="680973" algn="l"/>
-                <a:tab pos="1361945" algn="l"/>
-                <a:tab pos="2042918" algn="l"/>
-                <a:tab pos="2723891" algn="l"/>
-                <a:tab pos="3404864" algn="l"/>
-                <a:tab pos="4085836" algn="l"/>
-                <a:tab pos="4766809" algn="l"/>
-                <a:tab pos="5447782" algn="l"/>
-                <a:tab pos="6128755" algn="l"/>
-                <a:tab pos="6809727" algn="l"/>
-                <a:tab pos="7490700" algn="l"/>
-              </a:tabLst>
-            </a:pPr>
-            <a:r>
-              <a:rPr lang="es-ES" altLang="es-ES" sz="4515"/>
-              <a:t>Deskribapena</a:t>
-            </a:r>
-          </a:p>
-        </p:txBody>
-      </p:sp>
-      <p:sp>
-        <p:nvSpPr>
-          <p:cNvPr id="8194" name="Rectangle 2"/>
-          <p:cNvSpPr>
-            <a:spLocks noGrp="1" noChangeArrowheads="1"/>
-          </p:cNvSpPr>
-          <p:nvPr>
-            <p:ph type="body" idx="1"/>
-          </p:nvPr>
-        </p:nvSpPr>
-        <p:spPr>
-          <a:xfrm>
-            <a:off x="672024" y="2075994"/>
-            <a:ext cx="7808914" cy="4106810"/>
-          </a:xfrm>
-          <a:ln/>
-        </p:spPr>
-        <p:txBody>
-          <a:bodyPr/>
-          <a:lstStyle/>
-          <a:p>
-            <a:pPr marL="406194" indent="-304646" algn="just">
-              <a:buClr>
-                <a:srgbClr val="0E594D"/>
-              </a:buClr>
-              <a:buSzPct val="45000"/>
-              <a:buFont typeface="Wingdings" panose="05000000000000000000" pitchFamily="2" charset="2"/>
-              <a:buChar char=""/>
-              <a:tabLst>
-                <a:tab pos="680973" algn="l"/>
-                <a:tab pos="1361945" algn="l"/>
-                <a:tab pos="2042918" algn="l"/>
-                <a:tab pos="2723891" algn="l"/>
-                <a:tab pos="3404864" algn="l"/>
-                <a:tab pos="4085836" algn="l"/>
-                <a:tab pos="4766809" algn="l"/>
-                <a:tab pos="5447782" algn="l"/>
-                <a:tab pos="6128755" algn="l"/>
-                <a:tab pos="6809727" algn="l"/>
-                <a:tab pos="7490700" algn="l"/>
-              </a:tabLst>
-            </a:pPr>
-            <a:r>
-              <a:rPr lang="es-ES" altLang="es-ES" sz="2000" err="1"/>
-              <a:t>Bigarren</a:t>
-            </a:r>
-            <a:r>
-              <a:rPr lang="es-ES" altLang="es-ES" sz="2000"/>
-              <a:t> </a:t>
-            </a:r>
-            <a:r>
-              <a:rPr lang="es-ES" altLang="es-ES" sz="2000" err="1"/>
-              <a:t>karta</a:t>
-            </a:r>
-            <a:r>
-              <a:rPr lang="es-ES" altLang="es-ES" sz="2000"/>
-              <a:t> </a:t>
-            </a:r>
-            <a:r>
-              <a:rPr lang="es-ES" altLang="es-ES" sz="2000" err="1"/>
-              <a:t>banaketa</a:t>
-            </a:r>
-            <a:r>
-              <a:rPr lang="es-ES" altLang="es-ES" sz="2000"/>
-              <a:t>: </a:t>
-            </a:r>
-            <a:r>
-              <a:rPr lang="es-ES" altLang="es-ES" sz="2000" err="1"/>
-              <a:t>Lehenengoan</a:t>
-            </a:r>
-            <a:r>
-              <a:rPr lang="es-ES" altLang="es-ES" sz="2000"/>
-              <a:t> 21 </a:t>
-            </a:r>
-            <a:r>
-              <a:rPr lang="es-ES" altLang="es-ES" sz="2000" err="1"/>
-              <a:t>heldu</a:t>
-            </a:r>
-            <a:r>
-              <a:rPr lang="es-ES" altLang="es-ES" sz="2000"/>
-              <a:t> </a:t>
-            </a:r>
-            <a:r>
-              <a:rPr lang="es-ES" altLang="es-ES" sz="2000" err="1"/>
-              <a:t>ez</a:t>
-            </a:r>
-            <a:r>
-              <a:rPr lang="es-ES" altLang="es-ES" sz="2000"/>
-              <a:t> </a:t>
-            </a:r>
-            <a:r>
-              <a:rPr lang="es-ES" altLang="es-ES" sz="2000" err="1"/>
-              <a:t>direnak</a:t>
-            </a:r>
-            <a:r>
-              <a:rPr lang="es-ES" altLang="es-ES" sz="2000"/>
-              <a:t> </a:t>
-            </a:r>
-            <a:r>
-              <a:rPr lang="es-ES" altLang="es-ES" sz="2000" err="1"/>
-              <a:t>karta</a:t>
-            </a:r>
-            <a:r>
-              <a:rPr lang="es-ES" altLang="es-ES" sz="2000"/>
-              <a:t> </a:t>
-            </a:r>
-            <a:r>
-              <a:rPr lang="es-ES" altLang="es-ES" sz="2000" err="1"/>
-              <a:t>gehiago</a:t>
-            </a:r>
-            <a:r>
-              <a:rPr lang="es-ES" altLang="es-ES" sz="2000"/>
-              <a:t> </a:t>
-            </a:r>
-            <a:r>
-              <a:rPr lang="es-ES" altLang="es-ES" sz="2000" err="1"/>
-              <a:t>eskatzeko</a:t>
-            </a:r>
-            <a:r>
-              <a:rPr lang="es-ES" altLang="es-ES" sz="2000"/>
-              <a:t> </a:t>
-            </a:r>
-            <a:r>
-              <a:rPr lang="es-ES" altLang="es-ES" sz="2000" err="1"/>
-              <a:t>eskubidea</a:t>
-            </a:r>
-            <a:r>
-              <a:rPr lang="es-ES" altLang="es-ES" sz="2000"/>
-              <a:t> </a:t>
-            </a:r>
-            <a:r>
-              <a:rPr lang="es-ES" altLang="es-ES" sz="2000" err="1"/>
-              <a:t>izango</a:t>
-            </a:r>
-            <a:r>
-              <a:rPr lang="es-ES" altLang="es-ES" sz="2000"/>
-              <a:t> </a:t>
-            </a:r>
-            <a:r>
-              <a:rPr lang="es-ES" altLang="es-ES" sz="2000" err="1"/>
-              <a:t>dute</a:t>
-            </a:r>
-            <a:r>
-              <a:rPr lang="es-ES" altLang="es-ES" sz="2000"/>
-              <a:t>, </a:t>
-            </a:r>
-            <a:r>
-              <a:rPr lang="es-ES" altLang="es-ES" sz="2000" err="1"/>
-              <a:t>nahi</a:t>
-            </a:r>
-            <a:r>
-              <a:rPr lang="es-ES" altLang="es-ES" sz="2000"/>
-              <a:t> </a:t>
-            </a:r>
-            <a:r>
-              <a:rPr lang="es-ES" altLang="es-ES" sz="2000" err="1"/>
-              <a:t>beste</a:t>
-            </a:r>
-            <a:r>
-              <a:rPr lang="es-ES" altLang="es-ES" sz="2000"/>
-              <a:t> </a:t>
-            </a:r>
-            <a:r>
-              <a:rPr lang="es-ES" altLang="es-ES" sz="2000" err="1"/>
-              <a:t>karta</a:t>
-            </a:r>
-            <a:r>
-              <a:rPr lang="es-ES" altLang="es-ES" sz="2000"/>
-              <a:t> </a:t>
-            </a:r>
-            <a:r>
-              <a:rPr lang="es-ES" altLang="es-ES" sz="2000" err="1"/>
-              <a:t>eskatu</a:t>
-            </a:r>
-            <a:r>
-              <a:rPr lang="es-ES" altLang="es-ES" sz="2000"/>
-              <a:t> </a:t>
-            </a:r>
-            <a:r>
-              <a:rPr lang="es-ES" altLang="es-ES" sz="2000" err="1"/>
-              <a:t>ahal</a:t>
-            </a:r>
-            <a:r>
-              <a:rPr lang="es-ES" altLang="es-ES" sz="2000"/>
-              <a:t> </a:t>
-            </a:r>
-            <a:r>
-              <a:rPr lang="es-ES" altLang="es-ES" sz="2000" err="1"/>
-              <a:t>dituzte</a:t>
-            </a:r>
-            <a:r>
-              <a:rPr lang="es-ES" altLang="es-ES" sz="2000"/>
-              <a:t> 21etik </a:t>
-            </a:r>
-            <a:r>
-              <a:rPr lang="es-ES" altLang="es-ES" sz="2000" err="1"/>
-              <a:t>pasatzen</a:t>
-            </a:r>
-            <a:r>
-              <a:rPr lang="es-ES" altLang="es-ES" sz="2000"/>
-              <a:t> </a:t>
-            </a:r>
-            <a:r>
-              <a:rPr lang="es-ES" altLang="es-ES" sz="2000" err="1"/>
-              <a:t>ez</a:t>
-            </a:r>
-            <a:r>
-              <a:rPr lang="es-ES" altLang="es-ES" sz="2000"/>
-              <a:t> </a:t>
-            </a:r>
-            <a:r>
-              <a:rPr lang="es-ES" altLang="es-ES" sz="2000" err="1"/>
-              <a:t>badira</a:t>
-            </a:r>
-            <a:r>
-              <a:rPr lang="es-ES" altLang="es-ES" sz="2000"/>
-              <a:t>. </a:t>
-            </a:r>
-            <a:r>
-              <a:rPr lang="es-ES" altLang="es-ES" sz="2000" err="1"/>
-              <a:t>Momentu</a:t>
-            </a:r>
-            <a:r>
-              <a:rPr lang="es-ES" altLang="es-ES" sz="2000"/>
-              <a:t> </a:t>
-            </a:r>
-            <a:r>
-              <a:rPr lang="es-ES" altLang="es-ES" sz="2000" err="1"/>
-              <a:t>honetan</a:t>
-            </a:r>
-            <a:r>
-              <a:rPr lang="es-ES" altLang="es-ES" sz="2000"/>
-              <a:t>, </a:t>
-            </a:r>
-            <a:r>
-              <a:rPr lang="es-ES" altLang="es-ES" sz="2000" err="1"/>
-              <a:t>croupierarekin</a:t>
-            </a:r>
-            <a:r>
-              <a:rPr lang="es-ES" altLang="es-ES" sz="2000"/>
-              <a:t> </a:t>
-            </a:r>
-            <a:r>
-              <a:rPr lang="es-ES" altLang="es-ES" sz="2000" err="1"/>
-              <a:t>jolasten</a:t>
-            </a:r>
-            <a:r>
-              <a:rPr lang="es-ES" altLang="es-ES" sz="2000"/>
-              <a:t> </a:t>
-            </a:r>
-            <a:r>
-              <a:rPr lang="es-ES" altLang="es-ES" sz="2000" err="1"/>
-              <a:t>badaude</a:t>
-            </a:r>
-            <a:r>
-              <a:rPr lang="es-ES" altLang="es-ES" sz="2000"/>
-              <a:t> </a:t>
-            </a:r>
-            <a:r>
-              <a:rPr lang="es-ES" altLang="es-ES" sz="2000" err="1"/>
-              <a:t>dobletzeko</a:t>
-            </a:r>
-            <a:r>
-              <a:rPr lang="es-ES" altLang="es-ES" sz="2000"/>
-              <a:t> </a:t>
-            </a:r>
-            <a:r>
-              <a:rPr lang="es-ES" altLang="es-ES" sz="2000" err="1"/>
-              <a:t>aukera</a:t>
-            </a:r>
-            <a:r>
-              <a:rPr lang="es-ES" altLang="es-ES" sz="2000"/>
-              <a:t> </a:t>
-            </a:r>
-            <a:r>
-              <a:rPr lang="es-ES" altLang="es-ES" sz="2000" err="1"/>
-              <a:t>ematen</a:t>
-            </a:r>
-            <a:r>
-              <a:rPr lang="es-ES" altLang="es-ES" sz="2000"/>
-              <a:t> </a:t>
-            </a:r>
-            <a:r>
-              <a:rPr lang="es-ES" altLang="es-ES" sz="2000" err="1"/>
-              <a:t>zaie</a:t>
-            </a:r>
-            <a:r>
-              <a:rPr lang="es-ES" altLang="es-ES" sz="2000"/>
-              <a:t>. </a:t>
-            </a:r>
-            <a:r>
-              <a:rPr lang="es-ES" altLang="es-ES" sz="2000" err="1"/>
-              <a:t>Doblatzea</a:t>
-            </a:r>
-            <a:r>
-              <a:rPr lang="es-ES" altLang="es-ES" sz="2000"/>
-              <a:t>, </a:t>
-            </a:r>
-            <a:r>
-              <a:rPr lang="es-ES" altLang="es-ES" sz="2000" err="1"/>
-              <a:t>zure</a:t>
-            </a:r>
-            <a:r>
-              <a:rPr lang="es-ES" altLang="es-ES" sz="2000"/>
-              <a:t> </a:t>
-            </a:r>
-            <a:r>
-              <a:rPr lang="es-ES" altLang="es-ES" sz="2000" err="1"/>
-              <a:t>apostua</a:t>
-            </a:r>
-            <a:r>
-              <a:rPr lang="es-ES" altLang="es-ES" sz="2000"/>
-              <a:t> </a:t>
-            </a:r>
-            <a:r>
-              <a:rPr lang="es-ES" altLang="es-ES" sz="2000" err="1"/>
-              <a:t>bikoiztea</a:t>
-            </a:r>
-            <a:r>
-              <a:rPr lang="es-ES" altLang="es-ES" sz="2000"/>
-              <a:t>, </a:t>
-            </a:r>
-            <a:r>
-              <a:rPr lang="es-ES" altLang="es-ES" sz="2000" err="1"/>
-              <a:t>karta</a:t>
-            </a:r>
-            <a:r>
-              <a:rPr lang="es-ES" altLang="es-ES" sz="2000"/>
-              <a:t> </a:t>
-            </a:r>
-            <a:r>
-              <a:rPr lang="es-ES" altLang="es-ES" sz="2000" err="1"/>
-              <a:t>bat</a:t>
-            </a:r>
-            <a:r>
-              <a:rPr lang="es-ES" altLang="es-ES" sz="2000"/>
-              <a:t> </a:t>
-            </a:r>
-            <a:r>
-              <a:rPr lang="es-ES" altLang="es-ES" sz="2000" err="1"/>
-              <a:t>hartzea</a:t>
-            </a:r>
-            <a:r>
-              <a:rPr lang="es-ES" altLang="es-ES" sz="2000"/>
-              <a:t> eta </a:t>
-            </a:r>
-            <a:r>
-              <a:rPr lang="es-ES" altLang="es-ES" sz="2000" err="1"/>
-              <a:t>plantatzea</a:t>
-            </a:r>
-            <a:r>
-              <a:rPr lang="es-ES" altLang="es-ES" sz="2000"/>
-              <a:t> da. </a:t>
-            </a:r>
-            <a:r>
-              <a:rPr lang="es-ES" altLang="es-ES" sz="2000" err="1"/>
-              <a:t>Doblatzen</a:t>
-            </a:r>
-            <a:r>
-              <a:rPr lang="es-ES" altLang="es-ES" sz="2000"/>
-              <a:t> </a:t>
-            </a:r>
-            <a:r>
-              <a:rPr lang="es-ES" altLang="es-ES" sz="2000" err="1"/>
-              <a:t>denean</a:t>
-            </a:r>
-            <a:r>
-              <a:rPr lang="es-ES" altLang="es-ES" sz="2000"/>
-              <a:t>, </a:t>
-            </a:r>
-            <a:r>
-              <a:rPr lang="es-ES" altLang="es-ES" sz="2000" err="1"/>
-              <a:t>croupierrak</a:t>
-            </a:r>
-            <a:r>
-              <a:rPr lang="es-ES" altLang="es-ES" sz="2000"/>
-              <a:t> ere </a:t>
-            </a:r>
-            <a:r>
-              <a:rPr lang="es-ES" altLang="es-ES" sz="2000" err="1"/>
-              <a:t>apostua</a:t>
-            </a:r>
-            <a:r>
-              <a:rPr lang="es-ES" altLang="es-ES" sz="2000"/>
-              <a:t> </a:t>
-            </a:r>
-            <a:r>
-              <a:rPr lang="es-ES" altLang="es-ES" sz="2000" err="1"/>
-              <a:t>doblatu</a:t>
-            </a:r>
-            <a:r>
-              <a:rPr lang="es-ES" altLang="es-ES" sz="2000"/>
-              <a:t> </a:t>
-            </a:r>
-            <a:r>
-              <a:rPr lang="es-ES" altLang="es-ES" sz="2000" err="1"/>
-              <a:t>beharko</a:t>
-            </a:r>
-            <a:r>
-              <a:rPr lang="es-ES" altLang="es-ES" sz="2000"/>
-              <a:t> du.</a:t>
-            </a:r>
-          </a:p>
-          <a:p>
-            <a:pPr marL="406194" indent="-304646" algn="just">
-              <a:buClr>
-                <a:srgbClr val="0E594D"/>
-              </a:buClr>
-              <a:buSzPct val="45000"/>
-              <a:buFont typeface="Wingdings" panose="05000000000000000000" pitchFamily="2" charset="2"/>
-              <a:buChar char=""/>
-              <a:tabLst>
-                <a:tab pos="680973" algn="l"/>
-                <a:tab pos="1361945" algn="l"/>
-                <a:tab pos="2042918" algn="l"/>
-                <a:tab pos="2723891" algn="l"/>
-                <a:tab pos="3404864" algn="l"/>
-                <a:tab pos="4085836" algn="l"/>
-                <a:tab pos="4766809" algn="l"/>
-                <a:tab pos="5447782" algn="l"/>
-                <a:tab pos="6128755" algn="l"/>
-                <a:tab pos="6809727" algn="l"/>
-                <a:tab pos="7490700" algn="l"/>
-              </a:tabLst>
-            </a:pPr>
-            <a:r>
-              <a:rPr lang="es-ES" altLang="es-ES" sz="2000" err="1"/>
-              <a:t>Irabazlea</a:t>
-            </a:r>
-            <a:r>
-              <a:rPr lang="es-ES" altLang="es-ES" sz="2000"/>
-              <a:t> </a:t>
-            </a:r>
-            <a:r>
-              <a:rPr lang="es-ES" altLang="es-ES" sz="2000" err="1"/>
-              <a:t>kalkulatu</a:t>
-            </a:r>
-            <a:r>
-              <a:rPr lang="es-ES" altLang="es-ES" sz="2000"/>
-              <a:t>: </a:t>
-            </a:r>
-            <a:r>
-              <a:rPr lang="es-ES" altLang="es-ES" sz="2000" err="1"/>
-              <a:t>Guztien</a:t>
-            </a:r>
-            <a:r>
-              <a:rPr lang="es-ES" altLang="es-ES" sz="2000"/>
-              <a:t> </a:t>
-            </a:r>
-            <a:r>
-              <a:rPr lang="es-ES" altLang="es-ES" sz="2000" err="1"/>
-              <a:t>txanda</a:t>
-            </a:r>
-            <a:r>
-              <a:rPr lang="es-ES" altLang="es-ES" sz="2000"/>
-              <a:t> </a:t>
-            </a:r>
-            <a:r>
-              <a:rPr lang="es-ES" altLang="es-ES" sz="2000" err="1"/>
-              <a:t>bukatu</a:t>
-            </a:r>
-            <a:r>
-              <a:rPr lang="es-ES" altLang="es-ES" sz="2000"/>
-              <a:t> </a:t>
-            </a:r>
-            <a:r>
-              <a:rPr lang="es-ES" altLang="es-ES" sz="2000" err="1"/>
-              <a:t>denean</a:t>
-            </a:r>
-            <a:r>
-              <a:rPr lang="es-ES" altLang="es-ES" sz="2000"/>
-              <a:t> </a:t>
-            </a:r>
-            <a:r>
-              <a:rPr lang="es-ES" altLang="es-ES" sz="2000" err="1"/>
-              <a:t>irabazlea</a:t>
-            </a:r>
-            <a:r>
-              <a:rPr lang="es-ES" altLang="es-ES" sz="2000"/>
-              <a:t> </a:t>
-            </a:r>
-            <a:r>
-              <a:rPr lang="es-ES" altLang="es-ES" sz="2000" err="1"/>
-              <a:t>kalkulatzeko</a:t>
-            </a:r>
-            <a:r>
-              <a:rPr lang="es-ES" altLang="es-ES" sz="2000"/>
-              <a:t> </a:t>
-            </a:r>
-            <a:r>
-              <a:rPr lang="es-ES" altLang="es-ES" sz="2000" err="1"/>
-              <a:t>momentua</a:t>
-            </a:r>
-            <a:r>
-              <a:rPr lang="es-ES" altLang="es-ES" sz="2000"/>
-              <a:t> </a:t>
-            </a:r>
-            <a:r>
-              <a:rPr lang="es-ES" altLang="es-ES" sz="2000" err="1"/>
-              <a:t>heldu</a:t>
-            </a:r>
-            <a:r>
-              <a:rPr lang="es-ES" altLang="es-ES" sz="2000"/>
-              <a:t> da. </a:t>
-            </a:r>
-            <a:r>
-              <a:rPr lang="es-ES" altLang="es-ES" sz="2000" err="1"/>
-              <a:t>Croupierrik</a:t>
-            </a:r>
-            <a:r>
-              <a:rPr lang="es-ES" altLang="es-ES" sz="2000"/>
-              <a:t> </a:t>
-            </a:r>
-            <a:r>
-              <a:rPr lang="es-ES" altLang="es-ES" sz="2000" err="1"/>
-              <a:t>gabe</a:t>
-            </a:r>
-            <a:r>
-              <a:rPr lang="es-ES" altLang="es-ES" sz="2000"/>
-              <a:t>, </a:t>
-            </a:r>
-            <a:r>
-              <a:rPr lang="es-ES" altLang="es-ES" sz="2000" err="1"/>
-              <a:t>irabazlea</a:t>
-            </a:r>
-            <a:r>
-              <a:rPr lang="es-ES" altLang="es-ES" sz="2000"/>
-              <a:t> orden </a:t>
-            </a:r>
-            <a:r>
-              <a:rPr lang="es-ES" altLang="es-ES" sz="2000" err="1"/>
-              <a:t>honetan</a:t>
-            </a:r>
-            <a:r>
-              <a:rPr lang="es-ES" altLang="es-ES" sz="2000"/>
-              <a:t> </a:t>
-            </a:r>
-            <a:r>
-              <a:rPr lang="es-ES" altLang="es-ES" sz="2000" err="1"/>
-              <a:t>kalkulatzen</a:t>
-            </a:r>
-            <a:r>
-              <a:rPr lang="es-ES" altLang="es-ES" sz="2000"/>
-              <a:t> da:</a:t>
-            </a:r>
-          </a:p>
-          <a:p>
-            <a:pPr marL="406194" indent="-304646" algn="just">
-              <a:buClr>
-                <a:srgbClr val="0E594D"/>
-              </a:buClr>
-              <a:buSzPct val="45000"/>
-              <a:buFont typeface="Wingdings" panose="05000000000000000000" pitchFamily="2" charset="2"/>
-              <a:buChar char=""/>
-              <a:tabLst>
-                <a:tab pos="680973" algn="l"/>
-                <a:tab pos="1361945" algn="l"/>
-                <a:tab pos="2042918" algn="l"/>
-                <a:tab pos="2723891" algn="l"/>
-                <a:tab pos="3404864" algn="l"/>
-                <a:tab pos="4085836" algn="l"/>
-                <a:tab pos="4766809" algn="l"/>
-                <a:tab pos="5447782" algn="l"/>
-                <a:tab pos="6128755" algn="l"/>
-                <a:tab pos="6809727" algn="l"/>
-                <a:tab pos="7490700" algn="l"/>
-              </a:tabLst>
-            </a:pPr>
-            <a:r>
-              <a:rPr lang="es-ES" altLang="es-ES" sz="2000" err="1"/>
-              <a:t>Blackjack</a:t>
-            </a:r>
-            <a:r>
-              <a:rPr lang="es-ES" altLang="es-ES" sz="2000"/>
-              <a:t> &gt; 21 &gt; 20 &gt; 19 &gt; … &gt; 1. </a:t>
-            </a:r>
-            <a:r>
-              <a:rPr lang="es-ES" altLang="es-ES" sz="2000" err="1"/>
-              <a:t>Jokalari</a:t>
-            </a:r>
-            <a:r>
-              <a:rPr lang="es-ES" altLang="es-ES" sz="2000"/>
-              <a:t> </a:t>
-            </a:r>
-            <a:r>
-              <a:rPr lang="es-ES" altLang="es-ES" sz="2000" err="1"/>
-              <a:t>guztien</a:t>
-            </a:r>
-            <a:r>
-              <a:rPr lang="es-ES" altLang="es-ES" sz="2000"/>
-              <a:t> </a:t>
-            </a:r>
-            <a:r>
-              <a:rPr lang="es-ES" altLang="es-ES" sz="2000" err="1"/>
-              <a:t>eskua</a:t>
-            </a:r>
-            <a:r>
-              <a:rPr lang="es-ES" altLang="es-ES" sz="2000"/>
-              <a:t> &gt; 21 </a:t>
-            </a:r>
-            <a:r>
-              <a:rPr lang="es-ES" altLang="es-ES" sz="2000" err="1"/>
-              <a:t>bada</a:t>
-            </a:r>
-            <a:r>
-              <a:rPr lang="es-ES" altLang="es-ES" sz="2000"/>
-              <a:t> </a:t>
-            </a:r>
-            <a:r>
-              <a:rPr lang="es-ES" altLang="es-ES" sz="2000" err="1"/>
-              <a:t>ez</a:t>
-            </a:r>
-            <a:r>
-              <a:rPr lang="es-ES" altLang="es-ES" sz="2000"/>
-              <a:t> </a:t>
-            </a:r>
-            <a:r>
-              <a:rPr lang="es-ES" altLang="es-ES" sz="2000" err="1"/>
-              <a:t>dago</a:t>
-            </a:r>
-            <a:r>
-              <a:rPr lang="es-ES" altLang="es-ES" sz="2000"/>
-              <a:t> </a:t>
-            </a:r>
-            <a:r>
-              <a:rPr lang="es-ES" altLang="es-ES" sz="2000" err="1"/>
-              <a:t>irabazlerik</a:t>
-            </a:r>
-            <a:r>
-              <a:rPr lang="es-ES" altLang="es-ES" sz="2000"/>
-              <a:t>. </a:t>
-            </a:r>
-            <a:r>
-              <a:rPr lang="es-ES" altLang="es-ES" sz="2000" err="1"/>
-              <a:t>Croupierra</a:t>
-            </a:r>
-            <a:r>
-              <a:rPr lang="es-ES" altLang="es-ES" sz="2000"/>
-              <a:t> </a:t>
-            </a:r>
-            <a:r>
-              <a:rPr lang="es-ES" altLang="es-ES" sz="2000" err="1"/>
-              <a:t>egoteko</a:t>
-            </a:r>
-            <a:r>
-              <a:rPr lang="es-ES" altLang="es-ES" sz="2000"/>
-              <a:t> </a:t>
-            </a:r>
-            <a:r>
-              <a:rPr lang="es-ES" altLang="es-ES" sz="2000" err="1"/>
-              <a:t>kasuan</a:t>
-            </a:r>
-            <a:r>
-              <a:rPr lang="es-ES" altLang="es-ES" sz="2000"/>
-              <a:t> </a:t>
-            </a:r>
-            <a:r>
-              <a:rPr lang="es-ES" altLang="es-ES" sz="2000" err="1"/>
-              <a:t>irabazle</a:t>
-            </a:r>
-            <a:r>
-              <a:rPr lang="es-ES" altLang="es-ES" sz="2000"/>
-              <a:t> </a:t>
-            </a:r>
-            <a:r>
-              <a:rPr lang="es-ES" altLang="es-ES" sz="2000" err="1"/>
-              <a:t>bat</a:t>
-            </a:r>
-            <a:r>
-              <a:rPr lang="es-ES" altLang="es-ES" sz="2000"/>
-              <a:t> </a:t>
-            </a:r>
-            <a:r>
-              <a:rPr lang="es-ES" altLang="es-ES" sz="2000" err="1"/>
-              <a:t>baino</a:t>
-            </a:r>
-            <a:r>
-              <a:rPr lang="es-ES" altLang="es-ES" sz="2000"/>
-              <a:t> </a:t>
-            </a:r>
-            <a:r>
-              <a:rPr lang="es-ES" altLang="es-ES" sz="2000" err="1"/>
-              <a:t>gehiago</a:t>
-            </a:r>
-            <a:r>
-              <a:rPr lang="es-ES" altLang="es-ES" sz="2000"/>
-              <a:t> </a:t>
-            </a:r>
-            <a:r>
-              <a:rPr lang="es-ES" altLang="es-ES" sz="2000" err="1"/>
-              <a:t>egon</a:t>
-            </a:r>
-            <a:r>
-              <a:rPr lang="es-ES" altLang="es-ES" sz="2000"/>
-              <a:t> </a:t>
-            </a:r>
-            <a:r>
-              <a:rPr lang="es-ES" altLang="es-ES" sz="2000" err="1"/>
-              <a:t>ahal</a:t>
-            </a:r>
-            <a:r>
-              <a:rPr lang="es-ES" altLang="es-ES" sz="2000"/>
-              <a:t> </a:t>
-            </a:r>
-            <a:r>
-              <a:rPr lang="es-ES" altLang="es-ES" sz="2000" err="1"/>
-              <a:t>dira</a:t>
-            </a:r>
-            <a:r>
-              <a:rPr lang="es-ES" altLang="es-ES" sz="2000"/>
-              <a:t>. </a:t>
-            </a:r>
-            <a:r>
-              <a:rPr lang="es-ES" altLang="es-ES" sz="2000" err="1"/>
-              <a:t>Goiko</a:t>
-            </a:r>
-            <a:r>
-              <a:rPr lang="es-ES" altLang="es-ES" sz="2000"/>
-              <a:t> </a:t>
-            </a:r>
-            <a:r>
-              <a:rPr lang="es-ES" altLang="es-ES" sz="2000" err="1"/>
-              <a:t>metodo</a:t>
-            </a:r>
-            <a:r>
-              <a:rPr lang="es-ES" altLang="es-ES" sz="2000"/>
-              <a:t> </a:t>
-            </a:r>
-            <a:r>
-              <a:rPr lang="es-ES" altLang="es-ES" sz="2000" err="1"/>
-              <a:t>berdina</a:t>
-            </a:r>
-            <a:r>
-              <a:rPr lang="es-ES" altLang="es-ES" sz="2000"/>
-              <a:t> </a:t>
-            </a:r>
-            <a:r>
-              <a:rPr lang="es-ES" altLang="es-ES" sz="2000" err="1"/>
-              <a:t>jarraitzen</a:t>
-            </a:r>
-            <a:r>
-              <a:rPr lang="es-ES" altLang="es-ES" sz="2000"/>
-              <a:t> da, </a:t>
-            </a:r>
-            <a:r>
-              <a:rPr lang="es-ES" altLang="es-ES" sz="2000" err="1"/>
-              <a:t>baina</a:t>
-            </a:r>
-            <a:r>
-              <a:rPr lang="es-ES" altLang="es-ES" sz="2000"/>
-              <a:t> </a:t>
-            </a:r>
-            <a:r>
-              <a:rPr lang="es-ES" altLang="es-ES" sz="2000" err="1"/>
-              <a:t>irabazle</a:t>
-            </a:r>
-            <a:r>
-              <a:rPr lang="es-ES" altLang="es-ES" sz="2000"/>
-              <a:t> </a:t>
-            </a:r>
-            <a:r>
-              <a:rPr lang="es-ES" altLang="es-ES" sz="2000" err="1"/>
-              <a:t>moduan</a:t>
-            </a:r>
-            <a:r>
-              <a:rPr lang="es-ES" altLang="es-ES" sz="2000"/>
-              <a:t> </a:t>
-            </a:r>
-            <a:r>
-              <a:rPr lang="es-ES" altLang="es-ES" sz="2000" err="1"/>
-              <a:t>croupierra</a:t>
-            </a:r>
-            <a:r>
-              <a:rPr lang="es-ES" altLang="es-ES" sz="2000"/>
-              <a:t> </a:t>
-            </a:r>
-            <a:r>
-              <a:rPr lang="es-ES" altLang="es-ES" sz="2000" err="1"/>
-              <a:t>baino</a:t>
-            </a:r>
-            <a:r>
-              <a:rPr lang="es-ES" altLang="es-ES" sz="2000"/>
-              <a:t> </a:t>
-            </a:r>
-            <a:r>
-              <a:rPr lang="es-ES" altLang="es-ES" sz="2000" err="1"/>
-              <a:t>esku</a:t>
-            </a:r>
-            <a:r>
-              <a:rPr lang="es-ES" altLang="es-ES" sz="2000"/>
-              <a:t> </a:t>
-            </a:r>
-            <a:r>
-              <a:rPr lang="es-ES" altLang="es-ES" sz="2000" err="1"/>
-              <a:t>hobeagoa</a:t>
-            </a:r>
-            <a:r>
-              <a:rPr lang="es-ES" altLang="es-ES" sz="2000"/>
-              <a:t> </a:t>
-            </a:r>
-            <a:r>
-              <a:rPr lang="es-ES" altLang="es-ES" sz="2000" err="1"/>
-              <a:t>daukaten</a:t>
-            </a:r>
-            <a:r>
-              <a:rPr lang="es-ES" altLang="es-ES" sz="2000"/>
-              <a:t> </a:t>
-            </a:r>
-            <a:r>
-              <a:rPr lang="es-ES" altLang="es-ES" sz="2000" err="1"/>
-              <a:t>jokalari</a:t>
-            </a:r>
-            <a:r>
-              <a:rPr lang="es-ES" altLang="es-ES" sz="2000"/>
-              <a:t> </a:t>
-            </a:r>
-            <a:r>
-              <a:rPr lang="es-ES" altLang="es-ES" sz="2000" err="1"/>
-              <a:t>guztiak</a:t>
-            </a:r>
-            <a:r>
-              <a:rPr lang="es-ES" altLang="es-ES" sz="2000"/>
-              <a:t> </a:t>
-            </a:r>
-            <a:r>
-              <a:rPr lang="es-ES" altLang="es-ES" sz="2000" err="1"/>
-              <a:t>izango</a:t>
-            </a:r>
-            <a:r>
-              <a:rPr lang="es-ES" altLang="es-ES" sz="2000"/>
-              <a:t> </a:t>
-            </a:r>
-            <a:r>
-              <a:rPr lang="es-ES" altLang="es-ES" sz="2000" err="1"/>
-              <a:t>dira</a:t>
-            </a:r>
-            <a:r>
-              <a:rPr lang="es-ES" altLang="es-ES" sz="2000"/>
-              <a:t>.</a:t>
-            </a:r>
-          </a:p>
-        </p:txBody>
-      </p:sp>
-    </p:spTree>
-    <p:extLst>
-      <p:ext uri="{BB962C8B-B14F-4D97-AF65-F5344CB8AC3E}">
-        <p14:creationId xmlns:p14="http://schemas.microsoft.com/office/powerpoint/2010/main" val="3290258498"/>
-      </p:ext>
-    </p:extLst>
-  </p:cSld>
-  <p:clrMapOvr>
-    <a:masterClrMapping/>
-  </p:clrMapOvr>
-  <p:transition>
-    <p:wipe dir="u"/>
-  </p:transition>
-  <p:timing>
-    <p:tnLst>
-      <p:par>
-        <p:cTn id="1" dur="indefinite" nodeType="tmRoot">
-          <p:childTnLst>
-            <p:seq concurrent="1" nextAc="seek">
-              <p:cTn id="2" dur="0" nodeType="mainSeq"/>
-              <p:prevCondLst>
-                <p:cond evt="onPrev" delay="0">
-                  <p:tgtEl>
-                    <p:sldTgt/>
-                  </p:tgtEl>
-                </p:cond>
-              </p:prevCondLst>
-              <p:nextCondLst>
-                <p:cond evt="onNext" delay="0">
-                  <p:tgtEl>
-                    <p:sldTgt/>
-                  </p:tgtEl>
-                </p:cond>
-              </p:nextCondLst>
-            </p:seq>
-          </p:childTnLst>
-        </p:cTn>
-      </p:par>
-    </p:tnLst>
-  </p:timing>
-</p:sld>
-</file>
-
-<file path=ppt/slides/slide6.xml><?xml version="1.0" encoding="utf-8"?>
 <p:sld xmlns:a="http://schemas.openxmlformats.org/drawingml/2006/main" xmlns:r="http://schemas.openxmlformats.org/officeDocument/2006/relationships" xmlns:p="http://schemas.openxmlformats.org/presentationml/2006/main">
   <p:cSld>
     <p:spTree>
@@ -22447,7 +21018,7 @@
   <p:timing>
     <p:tnLst>
       <p:par>
-        <p:cTn id="1" dur="indefinite" nodeType="tmRoot">
+        <p:cTn id="1" dur="indefinite" restart="never" nodeType="tmRoot">
           <p:childTnLst>
             <p:seq concurrent="1" nextAc="seek">
               <p:cTn id="2" dur="0" nodeType="mainSeq"/>
@@ -22474,7 +21045,7 @@
 </p:sld>
 </file>
 
-<file path=ppt/slides/slide7.xml><?xml version="1.0" encoding="utf-8"?>
+<file path=ppt/slides/slide6.xml><?xml version="1.0" encoding="utf-8"?>
 <p:sld xmlns:a="http://schemas.openxmlformats.org/drawingml/2006/main" xmlns:r="http://schemas.openxmlformats.org/officeDocument/2006/relationships" xmlns:p="http://schemas.openxmlformats.org/presentationml/2006/main">
   <p:cSld>
     <p:spTree>
@@ -22622,7 +21193,7 @@
   <p:timing>
     <p:tnLst>
       <p:par>
-        <p:cTn id="1" dur="indefinite" nodeType="tmRoot">
+        <p:cTn id="1" dur="indefinite" restart="never" nodeType="tmRoot">
           <p:childTnLst>
             <p:seq concurrent="1" nextAc="seek">
               <p:cTn id="2" dur="0" nodeType="mainSeq"/>
@@ -22649,7 +21220,7 @@
 </p:sld>
 </file>
 
-<file path=ppt/slides/slide8.xml><?xml version="1.0" encoding="utf-8"?>
+<file path=ppt/slides/slide7.xml><?xml version="1.0" encoding="utf-8"?>
 <p:sld xmlns:a="http://schemas.openxmlformats.org/drawingml/2006/main" xmlns:r="http://schemas.openxmlformats.org/officeDocument/2006/relationships" xmlns:p="http://schemas.openxmlformats.org/presentationml/2006/main">
   <p:cSld>
     <p:spTree>
@@ -22821,7 +21392,7 @@
   <p:timing>
     <p:tnLst>
       <p:par>
-        <p:cTn id="1" dur="indefinite" nodeType="tmRoot">
+        <p:cTn id="1" dur="indefinite" restart="never" nodeType="tmRoot">
           <p:childTnLst>
             <p:seq concurrent="1" nextAc="seek">
               <p:cTn id="2" dur="0" nodeType="mainSeq"/>
@@ -22848,7 +21419,7 @@
 </p:sld>
 </file>
 
-<file path=ppt/slides/slide9.xml><?xml version="1.0" encoding="utf-8"?>
+<file path=ppt/slides/slide8.xml><?xml version="1.0" encoding="utf-8"?>
 <p:sld xmlns:a="http://schemas.openxmlformats.org/drawingml/2006/main" xmlns:r="http://schemas.openxmlformats.org/officeDocument/2006/relationships" xmlns:p="http://schemas.openxmlformats.org/presentationml/2006/main">
   <p:cSld>
     <p:spTree>
@@ -22996,7 +21567,339 @@
   <p:timing>
     <p:tnLst>
       <p:par>
-        <p:cTn id="1" dur="indefinite" nodeType="tmRoot">
+        <p:cTn id="1" dur="indefinite" restart="never" nodeType="tmRoot">
+          <p:childTnLst>
+            <p:seq concurrent="1" nextAc="seek">
+              <p:cTn id="2" dur="0" nodeType="mainSeq"/>
+              <p:prevCondLst>
+                <p:cond evt="onPrev" delay="0">
+                  <p:tgtEl>
+                    <p:sldTgt/>
+                  </p:tgtEl>
+                </p:cond>
+              </p:prevCondLst>
+              <p:nextCondLst>
+                <p:cond evt="onNext" delay="0">
+                  <p:tgtEl>
+                    <p:sldTgt/>
+                  </p:tgtEl>
+                </p:cond>
+              </p:nextCondLst>
+            </p:seq>
+          </p:childTnLst>
+        </p:cTn>
+      </p:par>
+    </p:tnLst>
+  </p:timing>
+</p:sld>
+</file>
+
+<file path=ppt/slides/slide9.xml><?xml version="1.0" encoding="utf-8"?>
+<p:sld xmlns:a="http://schemas.openxmlformats.org/drawingml/2006/main" xmlns:r="http://schemas.openxmlformats.org/officeDocument/2006/relationships" xmlns:p="http://schemas.openxmlformats.org/presentationml/2006/main">
+  <p:cSld>
+    <p:spTree>
+      <p:nvGrpSpPr>
+        <p:cNvPr id="1" name=""/>
+        <p:cNvGrpSpPr/>
+        <p:nvPr/>
+      </p:nvGrpSpPr>
+      <p:grpSpPr>
+        <a:xfrm>
+          <a:off x="0" y="0"/>
+          <a:ext cx="0" cy="0"/>
+          <a:chOff x="0" y="0"/>
+          <a:chExt cx="0" cy="0"/>
+        </a:xfrm>
+      </p:grpSpPr>
+      <p:sp>
+        <p:nvSpPr>
+          <p:cNvPr id="13313" name="Rectangle 1"/>
+          <p:cNvSpPr>
+            <a:spLocks noGrp="1" noChangeArrowheads="1"/>
+          </p:cNvSpPr>
+          <p:nvPr>
+            <p:ph type="title"/>
+          </p:nvPr>
+        </p:nvSpPr>
+        <p:spPr>
+          <a:xfrm>
+            <a:off x="672024" y="829016"/>
+            <a:ext cx="7808914" cy="1016996"/>
+          </a:xfrm>
+          <a:ln/>
+        </p:spPr>
+        <p:txBody>
+          <a:bodyPr vert="horz" wrap="square" lIns="90000" tIns="33188" rIns="90000" bIns="46800" numCol="1" anchor="b" anchorCtr="0" compatLnSpc="1">
+            <a:prstTxWarp prst="textNoShape">
+              <a:avLst/>
+            </a:prstTxWarp>
+          </a:bodyPr>
+          <a:lstStyle/>
+          <a:p>
+            <a:pPr>
+              <a:tabLst>
+                <a:tab pos="680973" algn="l"/>
+                <a:tab pos="1361945" algn="l"/>
+                <a:tab pos="2042918" algn="l"/>
+                <a:tab pos="2723891" algn="l"/>
+                <a:tab pos="3404864" algn="l"/>
+                <a:tab pos="4085836" algn="l"/>
+                <a:tab pos="4766809" algn="l"/>
+                <a:tab pos="5447782" algn="l"/>
+                <a:tab pos="6128755" algn="l"/>
+                <a:tab pos="6809727" algn="l"/>
+                <a:tab pos="7490700" algn="l"/>
+              </a:tabLst>
+            </a:pPr>
+            <a:r>
+              <a:rPr lang="es-ES" altLang="es-ES" sz="3763" err="1"/>
+              <a:t>Sekuentzia</a:t>
+            </a:r>
+            <a:r>
+              <a:rPr lang="es-ES" altLang="es-ES" sz="3763"/>
+              <a:t> Diagrama</a:t>
+            </a:r>
+          </a:p>
+        </p:txBody>
+      </p:sp>
+      <p:pic>
+        <p:nvPicPr>
+          <p:cNvPr id="13314" name="Picture 2"/>
+          <p:cNvPicPr>
+            <a:picLocks noChangeAspect="1" noChangeArrowheads="1"/>
+          </p:cNvPicPr>
+          <p:nvPr/>
+        </p:nvPicPr>
+        <p:blipFill rotWithShape="1">
+          <a:blip r:embed="rId3">
+            <a:extLst>
+              <a:ext uri="{28A0092B-C50C-407E-A947-70E740481C1C}">
+                <a14:useLocalDpi xmlns:a14="http://schemas.microsoft.com/office/drawing/2010/main" val="0"/>
+              </a:ext>
+            </a:extLst>
+          </a:blip>
+          <a:srcRect r="39984" b="86458"/>
+          <a:stretch/>
+        </p:blipFill>
+        <p:spPr bwMode="auto">
+          <a:xfrm>
+            <a:off x="507659" y="2141959"/>
+            <a:ext cx="8439986" cy="4073927"/>
+          </a:xfrm>
+          <a:prstGeom prst="rect">
+            <a:avLst/>
+          </a:prstGeom>
+          <a:noFill/>
+          <a:ln>
+            <a:noFill/>
+          </a:ln>
+          <a:effectLst/>
+          <a:extLst>
+            <a:ext uri="{909E8E84-426E-40DD-AFC4-6F175D3DCCD1}">
+              <a14:hiddenFill xmlns:a14="http://schemas.microsoft.com/office/drawing/2010/main">
+                <a:blipFill dpi="0" rotWithShape="0">
+                  <a:blip/>
+                  <a:srcRect r="39984" b="-21335"/>
+                  <a:stretch>
+                    <a:fillRect/>
+                  </a:stretch>
+                </a:blipFill>
+              </a14:hiddenFill>
+            </a:ext>
+            <a:ext uri="{91240B29-F687-4F45-9708-019B960494DF}">
+              <a14:hiddenLine xmlns:a14="http://schemas.microsoft.com/office/drawing/2010/main" w="9525" cap="flat">
+                <a:solidFill>
+                  <a:srgbClr val="808080"/>
+                </a:solidFill>
+                <a:round/>
+                <a:headEnd/>
+                <a:tailEnd/>
+              </a14:hiddenLine>
+            </a:ext>
+            <a:ext uri="{AF507438-7753-43E0-B8FC-AC1667EBCBE1}">
+              <a14:hiddenEffects xmlns:a14="http://schemas.microsoft.com/office/drawing/2010/main">
+                <a:effectLst>
+                  <a:outerShdw dist="35921" dir="2700000" algn="ctr" rotWithShape="0">
+                    <a:srgbClr val="808080"/>
+                  </a:outerShdw>
+                </a:effectLst>
+              </a14:hiddenEffects>
+            </a:ext>
+          </a:extLst>
+        </p:spPr>
+      </p:pic>
+      <p:pic>
+        <p:nvPicPr>
+          <p:cNvPr id="4" name="Picture 2" descr="http://i.gyazo.com/bb2a5a97d5df6c22afda21d27924449e.png"/>
+          <p:cNvPicPr>
+            <a:picLocks noChangeAspect="1" noChangeArrowheads="1"/>
+          </p:cNvPicPr>
+          <p:nvPr/>
+        </p:nvPicPr>
+        <p:blipFill>
+          <a:blip r:embed="rId4" cstate="print">
+            <a:extLst>
+              <a:ext uri="{28A0092B-C50C-407E-A947-70E740481C1C}">
+                <a14:useLocalDpi xmlns:a14="http://schemas.microsoft.com/office/drawing/2010/main" val="0"/>
+              </a:ext>
+            </a:extLst>
+          </a:blip>
+          <a:srcRect/>
+          <a:stretch>
+            <a:fillRect/>
+          </a:stretch>
+        </p:blipFill>
+        <p:spPr bwMode="auto">
+          <a:xfrm>
+            <a:off x="7308304" y="117434"/>
+            <a:ext cx="1474650" cy="1876552"/>
+          </a:xfrm>
+          <a:prstGeom prst="rect">
+            <a:avLst/>
+          </a:prstGeom>
+          <a:noFill/>
+          <a:extLst>
+            <a:ext uri="{909E8E84-426E-40DD-AFC4-6F175D3DCCD1}">
+              <a14:hiddenFill xmlns:a14="http://schemas.microsoft.com/office/drawing/2010/main">
+                <a:solidFill>
+                  <a:srgbClr val="FFFFFF"/>
+                </a:solidFill>
+              </a14:hiddenFill>
+            </a:ext>
+          </a:extLst>
+        </p:spPr>
+      </p:pic>
+      <p:sp>
+        <p:nvSpPr>
+          <p:cNvPr id="5" name="Llamada rectangular redondeada 4"/>
+          <p:cNvSpPr/>
+          <p:nvPr/>
+        </p:nvSpPr>
+        <p:spPr bwMode="auto">
+          <a:xfrm>
+            <a:off x="2339752" y="347824"/>
+            <a:ext cx="4800168" cy="854002"/>
+          </a:xfrm>
+          <a:prstGeom prst="wedgeRoundRectCallout">
+            <a:avLst>
+              <a:gd name="adj1" fmla="val 50106"/>
+              <a:gd name="adj2" fmla="val 76173"/>
+              <a:gd name="adj3" fmla="val 16667"/>
+            </a:avLst>
+          </a:prstGeom>
+          <a:solidFill>
+            <a:schemeClr val="bg1"/>
+          </a:solidFill>
+          <a:ln w="9525" cap="flat" cmpd="sng" algn="ctr">
+            <a:solidFill>
+              <a:schemeClr val="tx1"/>
+            </a:solidFill>
+            <a:prstDash val="solid"/>
+            <a:round/>
+            <a:headEnd type="none" w="med" len="med"/>
+            <a:tailEnd type="none" w="med" len="med"/>
+          </a:ln>
+          <a:effectLst/>
+          <a:extLst/>
+        </p:spPr>
+        <p:txBody>
+          <a:bodyPr vert="horz" wrap="square" lIns="91440" tIns="45720" rIns="91440" bIns="45720" numCol="1" rtlCol="0" anchor="t" anchorCtr="0" compatLnSpc="1">
+            <a:prstTxWarp prst="textNoShape">
+              <a:avLst/>
+            </a:prstTxWarp>
+          </a:bodyPr>
+          <a:lstStyle/>
+          <a:p>
+            <a:pPr marL="0" marR="0" indent="0" algn="l" defTabSz="449263" rtl="0" eaLnBrk="1" fontAlgn="base" latinLnBrk="0" hangingPunct="1">
+              <a:lnSpc>
+                <a:spcPct val="100000"/>
+              </a:lnSpc>
+              <a:spcBef>
+                <a:spcPct val="0"/>
+              </a:spcBef>
+              <a:spcAft>
+                <a:spcPct val="0"/>
+              </a:spcAft>
+              <a:buClr>
+                <a:srgbClr val="000000"/>
+              </a:buClr>
+              <a:buSzPct val="100000"/>
+              <a:buFont typeface="Times New Roman" pitchFamily="16" charset="0"/>
+              <a:buNone/>
+              <a:tabLst/>
+            </a:pPr>
+            <a:endParaRPr kumimoji="0" lang="es-ES" sz="2400" b="0" i="0" u="none" strike="noStrike" cap="none" normalizeH="0" baseline="0" smtClean="0">
+              <a:ln>
+                <a:noFill/>
+              </a:ln>
+              <a:solidFill>
+                <a:schemeClr val="bg1"/>
+              </a:solidFill>
+              <a:effectLst/>
+              <a:latin typeface="Verdana" pitchFamily="32" charset="0"/>
+            </a:endParaRPr>
+          </a:p>
+        </p:txBody>
+      </p:sp>
+      <p:sp>
+        <p:nvSpPr>
+          <p:cNvPr id="6" name="CuadroTexto 5"/>
+          <p:cNvSpPr txBox="1"/>
+          <p:nvPr/>
+        </p:nvSpPr>
+        <p:spPr>
+          <a:xfrm>
+            <a:off x="2411760" y="347824"/>
+            <a:ext cx="4728160" cy="707886"/>
+          </a:xfrm>
+          <a:prstGeom prst="rect">
+            <a:avLst/>
+          </a:prstGeom>
+          <a:noFill/>
+        </p:spPr>
+        <p:txBody>
+          <a:bodyPr wrap="square" rtlCol="0">
+            <a:spAutoFit/>
+          </a:bodyPr>
+          <a:lstStyle/>
+          <a:p>
+            <a:r>
+              <a:rPr lang="es-ES" sz="2000" smtClean="0">
+                <a:solidFill>
+                  <a:schemeClr val="accent6">
+                    <a:lumMod val="75000"/>
+                  </a:schemeClr>
+                </a:solidFill>
+              </a:rPr>
+              <a:t>Sekuentzia-diagrama zatitu dugu zuen ikusmenaren onuragatik </a:t>
+            </a:r>
+            <a:endParaRPr lang="es-ES" sz="2000">
+              <a:solidFill>
+                <a:schemeClr val="accent6">
+                  <a:lumMod val="75000"/>
+                </a:schemeClr>
+              </a:solidFill>
+            </a:endParaRPr>
+          </a:p>
+        </p:txBody>
+      </p:sp>
+    </p:spTree>
+    <p:extLst>
+      <p:ext uri="{BB962C8B-B14F-4D97-AF65-F5344CB8AC3E}">
+        <p14:creationId xmlns:p14="http://schemas.microsoft.com/office/powerpoint/2010/main" val="3464994919"/>
+      </p:ext>
+    </p:extLst>
+  </p:cSld>
+  <p:clrMapOvr>
+    <a:masterClrMapping/>
+  </p:clrMapOvr>
+  <p:transition>
+    <p:wipe dir="u"/>
+  </p:transition>
+  <p:timing>
+    <p:tnLst>
+      <p:par>
+        <p:cTn id="1" dur="indefinite" restart="never" nodeType="tmRoot">
           <p:childTnLst>
             <p:seq concurrent="1" nextAc="seek">
               <p:cTn id="2" dur="0" nodeType="mainSeq"/>

</xml_diff>